<commit_message>
update bragg tutorial documentation slides
</commit_message>
<xml_diff>
--- a/SiEPIC_Photonics_Package/solvers_simulators/tutorials/Bragg_tutorial/Workshop.pptx
+++ b/SiEPIC_Photonics_Package/solvers_simulators/tutorials/Bragg_tutorial/Workshop.pptx
@@ -7,10 +7,10 @@
     <p:sldMasterId id="2147484533" r:id="rId3"/>
   </p:sldMasterIdLst>
   <p:notesMasterIdLst>
-    <p:notesMasterId r:id="rId15"/>
+    <p:notesMasterId r:id="rId17"/>
   </p:notesMasterIdLst>
   <p:handoutMasterIdLst>
-    <p:handoutMasterId r:id="rId16"/>
+    <p:handoutMasterId r:id="rId18"/>
   </p:handoutMasterIdLst>
   <p:sldIdLst>
     <p:sldId id="426" r:id="rId4"/>
@@ -24,6 +24,8 @@
     <p:sldId id="472" r:id="rId12"/>
     <p:sldId id="475" r:id="rId13"/>
     <p:sldId id="476" r:id="rId14"/>
+    <p:sldId id="477" r:id="rId15"/>
+    <p:sldId id="478" r:id="rId16"/>
   </p:sldIdLst>
   <p:sldSz cx="9144000" cy="6858000" type="screen4x3"/>
   <p:notesSz cx="6858000" cy="9144000"/>
@@ -288,7 +290,7 @@
             <a:fld id="{16215AEE-C922-4944-98A7-22910184AC8A}" type="datetimeFigureOut">
               <a:rPr lang="en-US" altLang="zh-CN"/>
               <a:pPr/>
-              <a:t>3/4/2020</a:t>
+              <a:t>5/1/2020</a:t>
             </a:fld>
             <a:endParaRPr lang="en-US" altLang="zh-CN"/>
           </a:p>
@@ -492,7 +494,7 @@
             <a:fld id="{CA038EEF-2DAF-6B44-A6B5-C268C3465D47}" type="datetimeFigureOut">
               <a:rPr lang="en-CA" altLang="zh-CN"/>
               <a:pPr/>
-              <a:t>2020-03-04</a:t>
+              <a:t>2020-05-01</a:t>
             </a:fld>
             <a:endParaRPr lang="en-CA" altLang="zh-CN"/>
           </a:p>
@@ -1257,6 +1259,176 @@
 </p:notes>
 </file>
 
+<file path=ppt/notesSlides/notesSlide12.xml><?xml version="1.0" encoding="utf-8"?>
+<p:notes xmlns:a="http://schemas.openxmlformats.org/drawingml/2006/main" xmlns:r="http://schemas.openxmlformats.org/officeDocument/2006/relationships" xmlns:p="http://schemas.openxmlformats.org/presentationml/2006/main">
+  <p:cSld>
+    <p:spTree>
+      <p:nvGrpSpPr>
+        <p:cNvPr id="1" name=""/>
+        <p:cNvGrpSpPr/>
+        <p:nvPr/>
+      </p:nvGrpSpPr>
+      <p:grpSpPr>
+        <a:xfrm>
+          <a:off x="0" y="0"/>
+          <a:ext cx="0" cy="0"/>
+          <a:chOff x="0" y="0"/>
+          <a:chExt cx="0" cy="0"/>
+        </a:xfrm>
+      </p:grpSpPr>
+      <p:sp>
+        <p:nvSpPr>
+          <p:cNvPr id="2" name="Slide Image Placeholder 1"/>
+          <p:cNvSpPr>
+            <a:spLocks noGrp="1" noRot="1" noChangeAspect="1"/>
+          </p:cNvSpPr>
+          <p:nvPr>
+            <p:ph type="sldImg"/>
+          </p:nvPr>
+        </p:nvSpPr>
+        <p:spPr/>
+      </p:sp>
+      <p:sp>
+        <p:nvSpPr>
+          <p:cNvPr id="3" name="Notes Placeholder 2"/>
+          <p:cNvSpPr>
+            <a:spLocks noGrp="1"/>
+          </p:cNvSpPr>
+          <p:nvPr>
+            <p:ph type="body" idx="1"/>
+          </p:nvPr>
+        </p:nvSpPr>
+        <p:spPr/>
+        <p:txBody>
+          <a:bodyPr/>
+          <a:lstStyle/>
+          <a:p>
+            <a:endParaRPr lang="en-CA" dirty="0"/>
+          </a:p>
+        </p:txBody>
+      </p:sp>
+      <p:sp>
+        <p:nvSpPr>
+          <p:cNvPr id="4" name="Slide Number Placeholder 3"/>
+          <p:cNvSpPr>
+            <a:spLocks noGrp="1"/>
+          </p:cNvSpPr>
+          <p:nvPr>
+            <p:ph type="sldNum" sz="quarter" idx="10"/>
+          </p:nvPr>
+        </p:nvSpPr>
+        <p:spPr/>
+        <p:txBody>
+          <a:bodyPr/>
+          <a:lstStyle/>
+          <a:p>
+            <a:fld id="{C013E244-2E7F-424D-868B-6272F407A4EB}" type="slidenum">
+              <a:rPr lang="en-CA" altLang="zh-CN" smtClean="0"/>
+              <a:pPr/>
+              <a:t>12</a:t>
+            </a:fld>
+            <a:endParaRPr lang="en-CA" altLang="zh-CN"/>
+          </a:p>
+        </p:txBody>
+      </p:sp>
+    </p:spTree>
+    <p:extLst>
+      <p:ext uri="{BB962C8B-B14F-4D97-AF65-F5344CB8AC3E}">
+        <p14:creationId xmlns:p14="http://schemas.microsoft.com/office/powerpoint/2010/main" val="1793843599"/>
+      </p:ext>
+    </p:extLst>
+  </p:cSld>
+  <p:clrMapOvr>
+    <a:masterClrMapping/>
+  </p:clrMapOvr>
+</p:notes>
+</file>
+
+<file path=ppt/notesSlides/notesSlide13.xml><?xml version="1.0" encoding="utf-8"?>
+<p:notes xmlns:a="http://schemas.openxmlformats.org/drawingml/2006/main" xmlns:r="http://schemas.openxmlformats.org/officeDocument/2006/relationships" xmlns:p="http://schemas.openxmlformats.org/presentationml/2006/main">
+  <p:cSld>
+    <p:spTree>
+      <p:nvGrpSpPr>
+        <p:cNvPr id="1" name=""/>
+        <p:cNvGrpSpPr/>
+        <p:nvPr/>
+      </p:nvGrpSpPr>
+      <p:grpSpPr>
+        <a:xfrm>
+          <a:off x="0" y="0"/>
+          <a:ext cx="0" cy="0"/>
+          <a:chOff x="0" y="0"/>
+          <a:chExt cx="0" cy="0"/>
+        </a:xfrm>
+      </p:grpSpPr>
+      <p:sp>
+        <p:nvSpPr>
+          <p:cNvPr id="2" name="Slide Image Placeholder 1"/>
+          <p:cNvSpPr>
+            <a:spLocks noGrp="1" noRot="1" noChangeAspect="1"/>
+          </p:cNvSpPr>
+          <p:nvPr>
+            <p:ph type="sldImg"/>
+          </p:nvPr>
+        </p:nvSpPr>
+        <p:spPr/>
+      </p:sp>
+      <p:sp>
+        <p:nvSpPr>
+          <p:cNvPr id="3" name="Notes Placeholder 2"/>
+          <p:cNvSpPr>
+            <a:spLocks noGrp="1"/>
+          </p:cNvSpPr>
+          <p:nvPr>
+            <p:ph type="body" idx="1"/>
+          </p:nvPr>
+        </p:nvSpPr>
+        <p:spPr/>
+        <p:txBody>
+          <a:bodyPr/>
+          <a:lstStyle/>
+          <a:p>
+            <a:endParaRPr lang="en-CA" dirty="0"/>
+          </a:p>
+        </p:txBody>
+      </p:sp>
+      <p:sp>
+        <p:nvSpPr>
+          <p:cNvPr id="4" name="Slide Number Placeholder 3"/>
+          <p:cNvSpPr>
+            <a:spLocks noGrp="1"/>
+          </p:cNvSpPr>
+          <p:nvPr>
+            <p:ph type="sldNum" sz="quarter" idx="10"/>
+          </p:nvPr>
+        </p:nvSpPr>
+        <p:spPr/>
+        <p:txBody>
+          <a:bodyPr/>
+          <a:lstStyle/>
+          <a:p>
+            <a:fld id="{C013E244-2E7F-424D-868B-6272F407A4EB}" type="slidenum">
+              <a:rPr lang="en-CA" altLang="zh-CN" smtClean="0"/>
+              <a:pPr/>
+              <a:t>13</a:t>
+            </a:fld>
+            <a:endParaRPr lang="en-CA" altLang="zh-CN"/>
+          </a:p>
+        </p:txBody>
+      </p:sp>
+    </p:spTree>
+    <p:extLst>
+      <p:ext uri="{BB962C8B-B14F-4D97-AF65-F5344CB8AC3E}">
+        <p14:creationId xmlns:p14="http://schemas.microsoft.com/office/powerpoint/2010/main" val="1586806537"/>
+      </p:ext>
+    </p:extLst>
+  </p:cSld>
+  <p:clrMapOvr>
+    <a:masterClrMapping/>
+  </p:clrMapOvr>
+</p:notes>
+</file>
+
 <file path=ppt/notesSlides/notesSlide2.xml><?xml version="1.0" encoding="utf-8"?>
 <p:notes xmlns:a="http://schemas.openxmlformats.org/drawingml/2006/main" xmlns:r="http://schemas.openxmlformats.org/officeDocument/2006/relationships" xmlns:p="http://schemas.openxmlformats.org/presentationml/2006/main">
   <p:cSld>
@@ -2121,7 +2293,7 @@
             <a:fld id="{2C31E0B7-D99D-9840-9AA4-AFE996601F1A}" type="datetime1">
               <a:rPr lang="en-US" altLang="zh-CN"/>
               <a:pPr/>
-              <a:t>3/4/2020</a:t>
+              <a:t>5/1/2020</a:t>
             </a:fld>
             <a:endParaRPr lang="en-US" altLang="zh-CN"/>
           </a:p>
@@ -2306,7 +2478,7 @@
             <a:fld id="{8CD81206-CB00-054A-A73E-85C388CF01BA}" type="datetime1">
               <a:rPr lang="en-US" altLang="zh-CN"/>
               <a:pPr/>
-              <a:t>3/4/2020</a:t>
+              <a:t>5/1/2020</a:t>
             </a:fld>
             <a:endParaRPr lang="en-US" altLang="zh-CN"/>
           </a:p>
@@ -2501,7 +2673,7 @@
             <a:fld id="{763C9DB7-BA8E-3248-A482-551635BAD7C2}" type="datetime1">
               <a:rPr lang="en-US" altLang="zh-CN"/>
               <a:pPr/>
-              <a:t>3/4/2020</a:t>
+              <a:t>5/1/2020</a:t>
             </a:fld>
             <a:endParaRPr lang="en-US" altLang="zh-CN"/>
           </a:p>
@@ -2635,7 +2807,7 @@
             <a:fld id="{E076C303-4390-464C-B7E9-6F5306EF3170}" type="datetime1">
               <a:rPr lang="en-US" altLang="zh-CN"/>
               <a:pPr/>
-              <a:t>3/4/2020</a:t>
+              <a:t>5/1/2020</a:t>
             </a:fld>
             <a:endParaRPr lang="en-US" altLang="zh-CN"/>
           </a:p>
@@ -2774,7 +2946,7 @@
             <a:fld id="{5CA8F940-8C0D-5F40-9547-CE421C3644DF}" type="datetime1">
               <a:rPr lang="en-US" altLang="zh-CN" smtClean="0"/>
               <a:pPr/>
-              <a:t>3/4/2020</a:t>
+              <a:t>5/1/2020</a:t>
             </a:fld>
             <a:endParaRPr lang="en-US" altLang="zh-CN"/>
           </a:p>
@@ -4130,7 +4302,7 @@
             <a:fld id="{93BCDC2B-E37E-7845-AABF-FC5B18D3CD04}" type="datetime1">
               <a:rPr lang="en-US" altLang="zh-CN" smtClean="0"/>
               <a:pPr/>
-              <a:t>3/4/2020</a:t>
+              <a:t>5/1/2020</a:t>
             </a:fld>
             <a:endParaRPr lang="en-US" altLang="zh-CN"/>
           </a:p>
@@ -5200,7 +5372,7 @@
             <a:fld id="{5CA8F940-8C0D-5F40-9547-CE421C3644DF}" type="datetime1">
               <a:rPr lang="en-US" altLang="zh-CN" smtClean="0"/>
               <a:pPr/>
-              <a:t>3/4/2020</a:t>
+              <a:t>5/1/2020</a:t>
             </a:fld>
             <a:endParaRPr lang="en-US" altLang="zh-CN"/>
           </a:p>
@@ -6247,7 +6419,7 @@
             <a:fld id="{DD399CBA-90F1-8740-8ACB-6A73FE316139}" type="datetime1">
               <a:rPr lang="en-US" altLang="zh-CN" smtClean="0"/>
               <a:pPr/>
-              <a:t>3/4/2020</a:t>
+              <a:t>5/1/2020</a:t>
             </a:fld>
             <a:endParaRPr lang="en-US" altLang="zh-CN"/>
           </a:p>
@@ -7245,7 +7417,7 @@
             <a:fld id="{93BCDC2B-E37E-7845-AABF-FC5B18D3CD04}" type="datetime1">
               <a:rPr lang="en-US" altLang="zh-CN"/>
               <a:pPr/>
-              <a:t>3/4/2020</a:t>
+              <a:t>5/1/2020</a:t>
             </a:fld>
             <a:endParaRPr lang="en-US" altLang="zh-CN"/>
           </a:p>
@@ -7869,7 +8041,7 @@
             <a:fld id="{5CA8F940-8C0D-5F40-9547-CE421C3644DF}" type="datetime1">
               <a:rPr lang="en-US" altLang="zh-CN"/>
               <a:pPr/>
-              <a:t>3/4/2020</a:t>
+              <a:t>5/1/2020</a:t>
             </a:fld>
             <a:endParaRPr lang="en-US" altLang="zh-CN"/>
           </a:p>
@@ -8435,7 +8607,7 @@
             <a:fld id="{DD399CBA-90F1-8740-8ACB-6A73FE316139}" type="datetime1">
               <a:rPr lang="en-US" altLang="zh-CN"/>
               <a:pPr/>
-              <a:t>3/4/2020</a:t>
+              <a:t>5/1/2020</a:t>
             </a:fld>
             <a:endParaRPr lang="en-US" altLang="zh-CN"/>
           </a:p>
@@ -8789,7 +8961,7 @@
             <a:fld id="{E65CEB06-13C5-8042-B7D9-86F62FC68B21}" type="datetime1">
               <a:rPr lang="en-US" altLang="zh-CN"/>
               <a:pPr/>
-              <a:t>3/4/2020</a:t>
+              <a:t>5/1/2020</a:t>
             </a:fld>
             <a:endParaRPr lang="en-US" altLang="zh-CN"/>
           </a:p>
@@ -9046,7 +9218,7 @@
             <a:fld id="{2C31E0B7-D99D-9840-9AA4-AFE996601F1A}" type="datetime1">
               <a:rPr lang="en-US" altLang="zh-CN"/>
               <a:pPr/>
-              <a:t>3/4/2020</a:t>
+              <a:t>5/1/2020</a:t>
             </a:fld>
             <a:endParaRPr lang="en-US" altLang="zh-CN"/>
           </a:p>
@@ -9231,7 +9403,7 @@
             <a:fld id="{E65CEB06-13C5-8042-B7D9-86F62FC68B21}" type="datetime1">
               <a:rPr lang="en-US" altLang="zh-CN"/>
               <a:pPr/>
-              <a:t>3/4/2020</a:t>
+              <a:t>5/1/2020</a:t>
             </a:fld>
             <a:endParaRPr lang="en-US" altLang="zh-CN"/>
           </a:p>
@@ -9493,7 +9665,7 @@
             <a:fld id="{385F2447-58C6-0F4D-AFAC-D240FBEAC3D4}" type="datetime1">
               <a:rPr lang="en-US" altLang="zh-CN"/>
               <a:pPr/>
-              <a:t>3/4/2020</a:t>
+              <a:t>5/1/2020</a:t>
             </a:fld>
             <a:endParaRPr lang="en-US" altLang="zh-CN"/>
           </a:p>
@@ -9795,7 +9967,7 @@
             <a:fld id="{E90B6505-6397-EF47-ACB9-9C7F9DC228F7}" type="datetime1">
               <a:rPr lang="en-US" altLang="zh-CN"/>
               <a:pPr/>
-              <a:t>3/4/2020</a:t>
+              <a:t>5/1/2020</a:t>
             </a:fld>
             <a:endParaRPr lang="en-US" altLang="zh-CN"/>
           </a:p>
@@ -10231,7 +10403,7 @@
             <a:fld id="{7DA9DDF0-8E9D-F747-A826-0A16262FD38B}" type="datetime1">
               <a:rPr lang="en-US" altLang="zh-CN"/>
               <a:pPr/>
-              <a:t>3/4/2020</a:t>
+              <a:t>5/1/2020</a:t>
             </a:fld>
             <a:endParaRPr lang="en-US" altLang="zh-CN"/>
           </a:p>
@@ -10365,7 +10537,7 @@
             <a:fld id="{3C451A12-666D-2B4A-9912-EC4A679D5D15}" type="datetime1">
               <a:rPr lang="en-US" altLang="zh-CN"/>
               <a:pPr/>
-              <a:t>3/4/2020</a:t>
+              <a:t>5/1/2020</a:t>
             </a:fld>
             <a:endParaRPr lang="en-US" altLang="zh-CN"/>
           </a:p>
@@ -10477,7 +10649,7 @@
             <a:fld id="{E38B5506-74D3-1544-BC99-3AF1A8C1C66D}" type="datetime1">
               <a:rPr lang="en-US" altLang="zh-CN"/>
               <a:pPr/>
-              <a:t>3/4/2020</a:t>
+              <a:t>5/1/2020</a:t>
             </a:fld>
             <a:endParaRPr lang="en-US" altLang="zh-CN"/>
           </a:p>
@@ -10769,7 +10941,7 @@
             <a:fld id="{E54C1426-CCF5-AF49-BEFF-95069A0371A2}" type="datetime1">
               <a:rPr lang="en-US" altLang="zh-CN"/>
               <a:pPr/>
-              <a:t>3/4/2020</a:t>
+              <a:t>5/1/2020</a:t>
             </a:fld>
             <a:endParaRPr lang="en-US" altLang="zh-CN"/>
           </a:p>
@@ -11044,7 +11216,7 @@
             <a:fld id="{F5DD3FC9-CD0F-8D4D-89C4-5B675B0D57BB}" type="datetime1">
               <a:rPr lang="en-US" altLang="zh-CN"/>
               <a:pPr/>
-              <a:t>3/4/2020</a:t>
+              <a:t>5/1/2020</a:t>
             </a:fld>
             <a:endParaRPr lang="en-US" altLang="zh-CN"/>
           </a:p>
@@ -11229,7 +11401,7 @@
             <a:fld id="{8CD81206-CB00-054A-A73E-85C388CF01BA}" type="datetime1">
               <a:rPr lang="en-US" altLang="zh-CN"/>
               <a:pPr/>
-              <a:t>3/4/2020</a:t>
+              <a:t>5/1/2020</a:t>
             </a:fld>
             <a:endParaRPr lang="en-US" altLang="zh-CN"/>
           </a:p>
@@ -11491,7 +11663,7 @@
             <a:fld id="{385F2447-58C6-0F4D-AFAC-D240FBEAC3D4}" type="datetime1">
               <a:rPr lang="en-US" altLang="zh-CN"/>
               <a:pPr/>
-              <a:t>3/4/2020</a:t>
+              <a:t>5/1/2020</a:t>
             </a:fld>
             <a:endParaRPr lang="en-US" altLang="zh-CN"/>
           </a:p>
@@ -11686,7 +11858,7 @@
             <a:fld id="{763C9DB7-BA8E-3248-A482-551635BAD7C2}" type="datetime1">
               <a:rPr lang="en-US" altLang="zh-CN"/>
               <a:pPr/>
-              <a:t>3/4/2020</a:t>
+              <a:t>5/1/2020</a:t>
             </a:fld>
             <a:endParaRPr lang="en-US" altLang="zh-CN"/>
           </a:p>
@@ -11820,7 +11992,7 @@
             <a:fld id="{E076C303-4390-464C-B7E9-6F5306EF3170}" type="datetime1">
               <a:rPr lang="en-US" altLang="zh-CN"/>
               <a:pPr/>
-              <a:t>3/4/2020</a:t>
+              <a:t>5/1/2020</a:t>
             </a:fld>
             <a:endParaRPr lang="en-US" altLang="zh-CN"/>
           </a:p>
@@ -12122,7 +12294,7 @@
             <a:fld id="{E90B6505-6397-EF47-ACB9-9C7F9DC228F7}" type="datetime1">
               <a:rPr lang="en-US" altLang="zh-CN"/>
               <a:pPr/>
-              <a:t>3/4/2020</a:t>
+              <a:t>5/1/2020</a:t>
             </a:fld>
             <a:endParaRPr lang="en-US" altLang="zh-CN"/>
           </a:p>
@@ -12558,7 +12730,7 @@
             <a:fld id="{7DA9DDF0-8E9D-F747-A826-0A16262FD38B}" type="datetime1">
               <a:rPr lang="en-US" altLang="zh-CN"/>
               <a:pPr/>
-              <a:t>3/4/2020</a:t>
+              <a:t>5/1/2020</a:t>
             </a:fld>
             <a:endParaRPr lang="en-US" altLang="zh-CN"/>
           </a:p>
@@ -12692,7 +12864,7 @@
             <a:fld id="{3C451A12-666D-2B4A-9912-EC4A679D5D15}" type="datetime1">
               <a:rPr lang="en-US" altLang="zh-CN"/>
               <a:pPr/>
-              <a:t>3/4/2020</a:t>
+              <a:t>5/1/2020</a:t>
             </a:fld>
             <a:endParaRPr lang="en-US" altLang="zh-CN"/>
           </a:p>
@@ -12804,7 +12976,7 @@
             <a:fld id="{E38B5506-74D3-1544-BC99-3AF1A8C1C66D}" type="datetime1">
               <a:rPr lang="en-US" altLang="zh-CN"/>
               <a:pPr/>
-              <a:t>3/4/2020</a:t>
+              <a:t>5/1/2020</a:t>
             </a:fld>
             <a:endParaRPr lang="en-US" altLang="zh-CN"/>
           </a:p>
@@ -13096,7 +13268,7 @@
             <a:fld id="{E54C1426-CCF5-AF49-BEFF-95069A0371A2}" type="datetime1">
               <a:rPr lang="en-US" altLang="zh-CN"/>
               <a:pPr/>
-              <a:t>3/4/2020</a:t>
+              <a:t>5/1/2020</a:t>
             </a:fld>
             <a:endParaRPr lang="en-US" altLang="zh-CN"/>
           </a:p>
@@ -13368,7 +13540,7 @@
             <a:fld id="{F5DD3FC9-CD0F-8D4D-89C4-5B675B0D57BB}" type="datetime1">
               <a:rPr lang="en-US" altLang="zh-CN"/>
               <a:pPr/>
-              <a:t>3/4/2020</a:t>
+              <a:t>5/1/2020</a:t>
             </a:fld>
             <a:endParaRPr lang="en-US" altLang="zh-CN"/>
           </a:p>
@@ -13655,7 +13827,7 @@
             <a:fld id="{DF89C5E0-80CB-C842-991E-0650A17D1E84}" type="datetime1">
               <a:rPr lang="en-US" altLang="zh-CN"/>
               <a:pPr/>
-              <a:t>3/4/2020</a:t>
+              <a:t>5/1/2020</a:t>
             </a:fld>
             <a:endParaRPr lang="en-US" altLang="zh-CN"/>
           </a:p>
@@ -14372,7 +14544,7 @@
             <a:fld id="{A47398D4-8B5A-BE43-B588-3D17D5B3482C}" type="datetime1">
               <a:rPr lang="en-US" altLang="zh-CN" smtClean="0"/>
               <a:pPr/>
-              <a:t>3/4/2020</a:t>
+              <a:t>5/1/2020</a:t>
             </a:fld>
             <a:endParaRPr lang="en-US" altLang="zh-CN"/>
           </a:p>
@@ -15086,7 +15258,7 @@
             <a:fld id="{DF89C5E0-80CB-C842-991E-0650A17D1E84}" type="datetime1">
               <a:rPr lang="en-US" altLang="zh-CN"/>
               <a:pPr/>
-              <a:t>3/4/2020</a:t>
+              <a:t>5/1/2020</a:t>
             </a:fld>
             <a:endParaRPr lang="en-US" altLang="zh-CN"/>
           </a:p>
@@ -15700,14 +15872,14 @@
                 <a:ea typeface="ＭＳ Ｐゴシック" charset="-128"/>
                 <a:cs typeface="Times New Roman" panose="02020603050405020304" pitchFamily="18" charset="0"/>
               </a:rPr>
-              <a:t>Design of Silicon Photonic Bragg Grating Devices</a:t>
-            </a:r>
-            <a:r>
-              <a:rPr kumimoji="0" lang="en-US" altLang="zh-CN" sz="2400" b="1" dirty="0">
+              <a:t>Design of Silicon Photonic Bragg Grating Devices with </a:t>
+            </a:r>
+            <a:r>
+              <a:rPr kumimoji="0" lang="en-US" altLang="zh-CN" sz="3200" b="1" dirty="0" err="1">
                 <a:ea typeface="ＭＳ Ｐゴシック" charset="-128"/>
                 <a:cs typeface="Times New Roman" panose="02020603050405020304" pitchFamily="18" charset="0"/>
               </a:rPr>
-              <a:t/>
+              <a:t>Lumerical</a:t>
             </a:r>
             <a:br>
               <a:rPr kumimoji="0" lang="en-US" altLang="zh-CN" sz="2400" b="1" dirty="0">
@@ -15715,13 +15887,6 @@
                 <a:cs typeface="Times New Roman" panose="02020603050405020304" pitchFamily="18" charset="0"/>
               </a:rPr>
             </a:br>
-            <a:r>
-              <a:rPr kumimoji="0" lang="en-US" altLang="zh-CN" sz="2000" b="1" dirty="0">
-                <a:ea typeface="ＭＳ Ｐゴシック" charset="-128"/>
-                <a:cs typeface="Times New Roman" panose="02020603050405020304" pitchFamily="18" charset="0"/>
-              </a:rPr>
-              <a:t/>
-            </a:r>
             <a:br>
               <a:rPr kumimoji="0" lang="en-US" altLang="zh-CN" sz="2000" b="1" dirty="0">
                 <a:ea typeface="ＭＳ Ｐゴシック" charset="-128"/>
@@ -15734,13 +15899,6 @@
                 <a:cs typeface="Times New Roman" panose="02020603050405020304" pitchFamily="18" charset="0"/>
               </a:rPr>
               <a:t>Vancouver, BC, Canada</a:t>
-            </a:r>
-            <a:r>
-              <a:rPr kumimoji="0" lang="en-US" altLang="zh-CN" sz="2000" b="1" dirty="0">
-                <a:ea typeface="ＭＳ Ｐゴシック" charset="-128"/>
-                <a:cs typeface="Times New Roman" panose="02020603050405020304" pitchFamily="18" charset="0"/>
-              </a:rPr>
-              <a:t/>
             </a:r>
             <a:br>
               <a:rPr kumimoji="0" lang="en-US" altLang="zh-CN" sz="2000" b="1" dirty="0">
@@ -15971,7 +16129,7 @@
             </a:r>
           </a:p>
           <a:p>
-            <a:endParaRPr kumimoji="0" lang="en-US" altLang="zh-CN" sz="1400" dirty="0" smtClean="0">
+            <a:endParaRPr kumimoji="0" lang="en-US" altLang="zh-CN" sz="1400" dirty="0">
               <a:solidFill>
                 <a:schemeClr val="bg1"/>
               </a:solidFill>
@@ -15982,7 +16140,7 @@
           </a:p>
           <a:p>
             <a:r>
-              <a:rPr kumimoji="0" lang="en-US" altLang="zh-CN" sz="1400" dirty="0" smtClean="0">
+              <a:rPr kumimoji="0" lang="en-US" altLang="zh-CN" sz="1400" dirty="0">
                 <a:solidFill>
                   <a:schemeClr val="bg1"/>
                 </a:solidFill>
@@ -15990,18 +16148,7 @@
                 <a:ea typeface="Times New Roman" charset="0"/>
                 <a:cs typeface="Times New Roman" charset="0"/>
               </a:rPr>
-              <a:t>The </a:t>
-            </a:r>
-            <a:r>
-              <a:rPr kumimoji="0" lang="en-US" altLang="zh-CN" sz="1400" dirty="0">
-                <a:solidFill>
-                  <a:schemeClr val="bg1"/>
-                </a:solidFill>
-                <a:latin typeface="+mj-lt"/>
-                <a:ea typeface="Times New Roman" charset="0"/>
-                <a:cs typeface="Times New Roman" charset="0"/>
-              </a:rPr>
-              <a:t>University of British Columbia, Vancouver</a:t>
+              <a:t>The University of British Columbia, Vancouver</a:t>
             </a:r>
           </a:p>
         </p:txBody>
@@ -16064,13 +16211,8 @@
           <a:p>
             <a:r>
               <a:rPr lang="en-CA" dirty="0"/>
-              <a:t>Bragg Gratings: </a:t>
-            </a:r>
-            <a:r>
-              <a:rPr lang="en-CA" dirty="0" smtClean="0"/>
-              <a:t>FDTD</a:t>
-            </a:r>
-            <a:endParaRPr lang="en-CA" dirty="0"/>
+              <a:t>Bragg Gratings: 3D/2D FDTD</a:t>
+            </a:r>
           </a:p>
         </p:txBody>
       </p:sp>
@@ -16170,7 +16312,7 @@
               <a:buChar char="•"/>
             </a:pPr>
             <a:r>
-              <a:rPr lang="en-US" sz="1600" dirty="0" smtClean="0">
+              <a:rPr lang="en-US" sz="1600" b="1" dirty="0">
                 <a:solidFill>
                   <a:srgbClr val="17375E"/>
                 </a:solidFill>
@@ -16184,7 +16326,7 @@
               <a:buChar char="•"/>
             </a:pPr>
             <a:r>
-              <a:rPr lang="en-US" sz="1200" dirty="0" smtClean="0">
+              <a:rPr lang="en-US" sz="1200" dirty="0">
                 <a:solidFill>
                   <a:srgbClr val="17375E"/>
                 </a:solidFill>
@@ -16192,14 +16334,14 @@
               <a:t>Simulating the full device length either in </a:t>
             </a:r>
             <a:r>
-              <a:rPr lang="en-US" sz="1200" b="1" dirty="0" smtClean="0">
+              <a:rPr lang="en-US" sz="1200" b="1" dirty="0">
                 <a:solidFill>
                   <a:srgbClr val="17375E"/>
                 </a:solidFill>
               </a:rPr>
               <a:t>2D FDTD or 3D FDTD</a:t>
             </a:r>
-            <a:endParaRPr lang="en-US" sz="1200" b="1" dirty="0" smtClean="0"/>
+            <a:endParaRPr lang="en-US" sz="1200" b="1" dirty="0"/>
           </a:p>
           <a:p>
             <a:pPr marL="1200150" lvl="2" indent="-285750">
@@ -16218,7 +16360,7 @@
               <a:buChar char="•"/>
             </a:pPr>
             <a:r>
-              <a:rPr lang="en-US" sz="1600" dirty="0" smtClean="0">
+              <a:rPr lang="en-US" sz="1600" b="1" dirty="0">
                 <a:solidFill>
                   <a:srgbClr val="17375E"/>
                 </a:solidFill>
@@ -16232,12 +16374,12 @@
               <a:buChar char="•"/>
             </a:pPr>
             <a:r>
-              <a:rPr lang="en-US" sz="1600" dirty="0" smtClean="0">
+              <a:rPr lang="en-US" sz="1600" dirty="0">
                 <a:solidFill>
                   <a:srgbClr val="17375E"/>
                 </a:solidFill>
               </a:rPr>
-              <a:t>Accurate, if the simulation mesh and time were sufficiently large.</a:t>
+              <a:t>Accurate, if the simulation mesh and time were sufficiently large…</a:t>
             </a:r>
           </a:p>
           <a:p>
@@ -16245,44 +16387,47 @@
               <a:buFont typeface="Arial" panose="020B0604020202020204" pitchFamily="34" charset="0"/>
               <a:buChar char="•"/>
             </a:pPr>
-            <a:endParaRPr lang="en-US" sz="1600" dirty="0" smtClean="0">
+            <a:r>
+              <a:rPr lang="en-US" sz="1600" dirty="0">
+                <a:solidFill>
+                  <a:srgbClr val="17375E"/>
+                </a:solidFill>
+              </a:rPr>
+              <a:t>Can be used to simulated complex apodization provide.</a:t>
+            </a:r>
+          </a:p>
+          <a:p>
+            <a:pPr marL="1200150" lvl="2" indent="-285750">
+              <a:buFont typeface="Arial" panose="020B0604020202020204" pitchFamily="34" charset="0"/>
+              <a:buChar char="•"/>
+            </a:pPr>
+            <a:endParaRPr lang="en-US" sz="1600" dirty="0">
               <a:solidFill>
                 <a:srgbClr val="17375E"/>
               </a:solidFill>
             </a:endParaRPr>
           </a:p>
           <a:p>
+            <a:pPr marL="742950" lvl="1" indent="-285750">
+              <a:buFont typeface="Arial" panose="020B0604020202020204" pitchFamily="34" charset="0"/>
+              <a:buChar char="•"/>
+            </a:pPr>
+            <a:r>
+              <a:rPr lang="en-US" sz="1600" b="1" dirty="0">
+                <a:solidFill>
+                  <a:srgbClr val="17375E"/>
+                </a:solidFill>
+              </a:rPr>
+              <a:t>Disadvantages:</a:t>
+            </a:r>
+          </a:p>
+          <a:p>
             <a:pPr marL="1200150" lvl="2" indent="-285750">
               <a:buFont typeface="Arial" panose="020B0604020202020204" pitchFamily="34" charset="0"/>
               <a:buChar char="•"/>
             </a:pPr>
-            <a:endParaRPr lang="en-US" sz="1600" dirty="0" smtClean="0">
-              <a:solidFill>
-                <a:srgbClr val="17375E"/>
-              </a:solidFill>
-            </a:endParaRPr>
-          </a:p>
-          <a:p>
-            <a:pPr marL="742950" lvl="1" indent="-285750">
-              <a:buFont typeface="Arial" panose="020B0604020202020204" pitchFamily="34" charset="0"/>
-              <a:buChar char="•"/>
-            </a:pPr>
-            <a:r>
-              <a:rPr lang="en-US" sz="1600" dirty="0" smtClean="0">
-                <a:solidFill>
-                  <a:srgbClr val="17375E"/>
-                </a:solidFill>
-              </a:rPr>
-              <a:t>Disadvantages:</a:t>
-            </a:r>
-          </a:p>
-          <a:p>
-            <a:pPr marL="1200150" lvl="2" indent="-285750">
-              <a:buFont typeface="Arial" panose="020B0604020202020204" pitchFamily="34" charset="0"/>
-              <a:buChar char="•"/>
-            </a:pPr>
-            <a:r>
-              <a:rPr lang="en-US" sz="1600" dirty="0" smtClean="0">
+            <a:r>
+              <a:rPr lang="en-US" sz="1600" dirty="0">
                 <a:solidFill>
                   <a:srgbClr val="17375E"/>
                 </a:solidFill>
@@ -16292,6 +16437,36 @@
           </a:p>
         </p:txBody>
       </p:sp>
+      <p:pic>
+        <p:nvPicPr>
+          <p:cNvPr id="3" name="Picture 2">
+            <a:extLst>
+              <a:ext uri="{FF2B5EF4-FFF2-40B4-BE49-F238E27FC236}">
+                <a16:creationId xmlns:a16="http://schemas.microsoft.com/office/drawing/2014/main" id="{A05DA367-5330-424B-BC4D-F0725709E5A8}"/>
+              </a:ext>
+            </a:extLst>
+          </p:cNvPr>
+          <p:cNvPicPr>
+            <a:picLocks noChangeAspect="1"/>
+          </p:cNvPicPr>
+          <p:nvPr/>
+        </p:nvPicPr>
+        <p:blipFill>
+          <a:blip r:embed="rId3"/>
+          <a:stretch>
+            <a:fillRect/>
+          </a:stretch>
+        </p:blipFill>
+        <p:spPr>
+          <a:xfrm>
+            <a:off x="5584830" y="3393733"/>
+            <a:ext cx="3559170" cy="2650266"/>
+          </a:xfrm>
+          <a:prstGeom prst="rect">
+            <a:avLst/>
+          </a:prstGeom>
+        </p:spPr>
+      </p:pic>
     </p:spTree>
     <p:extLst>
       <p:ext uri="{BB962C8B-B14F-4D97-AF65-F5344CB8AC3E}">
@@ -16350,13 +16525,8 @@
           <a:p>
             <a:r>
               <a:rPr lang="en-CA" dirty="0"/>
-              <a:t>Bragg Gratings: </a:t>
-            </a:r>
-            <a:r>
-              <a:rPr lang="en-CA" dirty="0" smtClean="0"/>
-              <a:t>FDTD</a:t>
-            </a:r>
-            <a:endParaRPr lang="en-CA" dirty="0"/>
+              <a:t>Bragg Gratings: 3D/2D FDTD</a:t>
+            </a:r>
           </a:p>
         </p:txBody>
       </p:sp>
@@ -16438,7 +16608,7 @@
         <p:spPr>
           <a:xfrm>
             <a:off x="107504" y="1250160"/>
-            <a:ext cx="9036496" cy="1077218"/>
+            <a:ext cx="9036496" cy="2062103"/>
           </a:xfrm>
           <a:prstGeom prst="rect">
             <a:avLst/>
@@ -16456,7 +16626,7 @@
               <a:buChar char="•"/>
             </a:pPr>
             <a:r>
-              <a:rPr lang="en-US" sz="1600" dirty="0" smtClean="0">
+              <a:rPr lang="en-US" sz="1600" dirty="0">
                 <a:solidFill>
                   <a:srgbClr val="17375E"/>
                 </a:solidFill>
@@ -16464,7 +16634,7 @@
               <a:t>Open FDTD project </a:t>
             </a:r>
             <a:r>
-              <a:rPr lang="en-US" sz="1600" b="1" dirty="0" err="1" smtClean="0">
+              <a:rPr lang="en-US" sz="1600" b="1" dirty="0" err="1">
                 <a:solidFill>
                   <a:srgbClr val="17375E"/>
                 </a:solidFill>
@@ -16472,7 +16642,7 @@
               <a:t>MAIN_FDTD.fsp</a:t>
             </a:r>
             <a:r>
-              <a:rPr lang="en-US" sz="1600" b="1" dirty="0" smtClean="0">
+              <a:rPr lang="en-US" sz="1600" b="1" dirty="0">
                 <a:solidFill>
                   <a:srgbClr val="17375E"/>
                 </a:solidFill>
@@ -16480,23 +16650,15 @@
               <a:t> </a:t>
             </a:r>
             <a:r>
-              <a:rPr lang="en-US" sz="1600" dirty="0" smtClean="0">
+              <a:rPr lang="en-US" sz="1600" dirty="0">
                 <a:solidFill>
                   <a:srgbClr val="17375E"/>
                 </a:solidFill>
               </a:rPr>
-              <a:t>and Run </a:t>
-            </a:r>
-            <a:r>
-              <a:rPr lang="en-US" sz="1600" dirty="0" smtClean="0">
-                <a:solidFill>
-                  <a:srgbClr val="17375E"/>
-                </a:solidFill>
-              </a:rPr>
-              <a:t>sample code </a:t>
-            </a:r>
-            <a:r>
-              <a:rPr lang="en-US" sz="1600" b="1" i="1" dirty="0" smtClean="0">
+              <a:t>and Run sample code </a:t>
+            </a:r>
+            <a:r>
+              <a:rPr lang="en-US" sz="1600" b="1" i="1" dirty="0">
                 <a:solidFill>
                   <a:srgbClr val="17375E"/>
                 </a:solidFill>
@@ -16504,7 +16666,7 @@
               <a:t> </a:t>
             </a:r>
             <a:r>
-              <a:rPr lang="en-US" sz="1600" b="1" i="1" dirty="0" err="1" smtClean="0">
+              <a:rPr lang="en-US" sz="1600" b="1" i="1" dirty="0" err="1">
                 <a:solidFill>
                   <a:srgbClr val="17375E"/>
                 </a:solidFill>
@@ -16522,7 +16684,7 @@
               <a:buFont typeface="Arial" panose="020B0604020202020204" pitchFamily="34" charset="0"/>
               <a:buChar char="•"/>
             </a:pPr>
-            <a:endParaRPr lang="en-US" sz="1600" b="1" i="1" dirty="0" smtClean="0">
+            <a:endParaRPr lang="en-US" sz="1600" b="1" i="1" dirty="0">
               <a:solidFill>
                 <a:srgbClr val="17375E"/>
               </a:solidFill>
@@ -16534,7 +16696,7 @@
               <a:buChar char="•"/>
             </a:pPr>
             <a:r>
-              <a:rPr lang="en-US" sz="1600" dirty="0" smtClean="0">
+              <a:rPr lang="en-US" sz="1600" b="1" dirty="0">
                 <a:solidFill>
                   <a:srgbClr val="17375E"/>
                 </a:solidFill>
@@ -16548,25 +16710,898 @@
               <a:buChar char="•"/>
             </a:pPr>
             <a:r>
-              <a:rPr lang="en-US" sz="1600" dirty="0" smtClean="0">
+              <a:rPr lang="en-US" sz="1600" dirty="0">
                 <a:solidFill>
                   <a:srgbClr val="17375E"/>
                 </a:solidFill>
               </a:rPr>
               <a:t>Device physical parameters</a:t>
             </a:r>
+          </a:p>
+          <a:p>
+            <a:pPr marL="1200150" lvl="2" indent="-285750">
+              <a:buFont typeface="Arial" panose="020B0604020202020204" pitchFamily="34" charset="0"/>
+              <a:buChar char="•"/>
+            </a:pPr>
+            <a:r>
+              <a:rPr lang="en-US" sz="1600" dirty="0">
+                <a:solidFill>
+                  <a:srgbClr val="17375E"/>
+                </a:solidFill>
+              </a:rPr>
+              <a:t>Simulation parameters</a:t>
+            </a:r>
+          </a:p>
+          <a:p>
+            <a:pPr marL="1200150" lvl="2" indent="-285750">
+              <a:buFont typeface="Arial" panose="020B0604020202020204" pitchFamily="34" charset="0"/>
+              <a:buChar char="•"/>
+            </a:pPr>
             <a:endParaRPr lang="en-US" sz="1600" dirty="0">
               <a:solidFill>
                 <a:srgbClr val="17375E"/>
               </a:solidFill>
             </a:endParaRPr>
           </a:p>
-        </p:txBody>
-      </p:sp>
+          <a:p>
+            <a:pPr marL="742950" lvl="1" indent="-285750">
+              <a:buFont typeface="Arial" panose="020B0604020202020204" pitchFamily="34" charset="0"/>
+              <a:buChar char="•"/>
+            </a:pPr>
+            <a:r>
+              <a:rPr lang="en-US" sz="1600" dirty="0">
+                <a:solidFill>
+                  <a:srgbClr val="17375E"/>
+                </a:solidFill>
+              </a:rPr>
+              <a:t>You can create an S-parameters sweep as well.</a:t>
+            </a:r>
+          </a:p>
+          <a:p>
+            <a:pPr marL="1200150" lvl="2" indent="-285750">
+              <a:buFont typeface="Arial" panose="020B0604020202020204" pitchFamily="34" charset="0"/>
+              <a:buChar char="•"/>
+            </a:pPr>
+            <a:r>
+              <a:rPr lang="en-US" sz="1600" dirty="0">
+                <a:solidFill>
+                  <a:srgbClr val="17375E"/>
+                </a:solidFill>
+              </a:rPr>
+              <a:t>You can use ports symmetry.</a:t>
+            </a:r>
+          </a:p>
+        </p:txBody>
+      </p:sp>
+      <p:sp>
+        <p:nvSpPr>
+          <p:cNvPr id="7" name="TextBox 6">
+            <a:extLst>
+              <a:ext uri="{FF2B5EF4-FFF2-40B4-BE49-F238E27FC236}">
+                <a16:creationId xmlns:a16="http://schemas.microsoft.com/office/drawing/2014/main" id="{E4BBB164-1407-49FB-B38B-1892BB440EA4}"/>
+              </a:ext>
+            </a:extLst>
+          </p:cNvPr>
+          <p:cNvSpPr txBox="1"/>
+          <p:nvPr/>
+        </p:nvSpPr>
+        <p:spPr>
+          <a:xfrm>
+            <a:off x="7881" y="5445224"/>
+            <a:ext cx="5068175" cy="646331"/>
+          </a:xfrm>
+          <a:prstGeom prst="rect">
+            <a:avLst/>
+          </a:prstGeom>
+          <a:noFill/>
+        </p:spPr>
+        <p:txBody>
+          <a:bodyPr wrap="square" rtlCol="0">
+            <a:spAutoFit/>
+          </a:bodyPr>
+          <a:lstStyle/>
+          <a:p>
+            <a:r>
+              <a:rPr lang="en-US" sz="1200" dirty="0"/>
+              <a:t>* There are rarely times you need to actually use 3D FDTD to simulate an entire length of a Bragg grating device. The example is added here for illustrating the inefficiency of the method relative to other methods.</a:t>
+            </a:r>
+          </a:p>
+        </p:txBody>
+      </p:sp>
+      <p:pic>
+        <p:nvPicPr>
+          <p:cNvPr id="3" name="Picture 2">
+            <a:extLst>
+              <a:ext uri="{FF2B5EF4-FFF2-40B4-BE49-F238E27FC236}">
+                <a16:creationId xmlns:a16="http://schemas.microsoft.com/office/drawing/2014/main" id="{8BD1A70C-CD32-4961-B0B0-42103752BF74}"/>
+              </a:ext>
+            </a:extLst>
+          </p:cNvPr>
+          <p:cNvPicPr>
+            <a:picLocks noChangeAspect="1"/>
+          </p:cNvPicPr>
+          <p:nvPr/>
+        </p:nvPicPr>
+        <p:blipFill>
+          <a:blip r:embed="rId3"/>
+          <a:stretch>
+            <a:fillRect/>
+          </a:stretch>
+        </p:blipFill>
+        <p:spPr>
+          <a:xfrm>
+            <a:off x="6426295" y="1862846"/>
+            <a:ext cx="2586526" cy="4176462"/>
+          </a:xfrm>
+          <a:prstGeom prst="rect">
+            <a:avLst/>
+          </a:prstGeom>
+        </p:spPr>
+      </p:pic>
     </p:spTree>
     <p:extLst>
       <p:ext uri="{BB962C8B-B14F-4D97-AF65-F5344CB8AC3E}">
         <p14:creationId xmlns:p14="http://schemas.microsoft.com/office/powerpoint/2010/main" val="192959779"/>
+      </p:ext>
+    </p:extLst>
+  </p:cSld>
+  <p:clrMapOvr>
+    <a:masterClrMapping/>
+  </p:clrMapOvr>
+</p:sld>
+</file>
+
+<file path=ppt/slides/slide12.xml><?xml version="1.0" encoding="utf-8"?>
+<p:sld xmlns:a="http://schemas.openxmlformats.org/drawingml/2006/main" xmlns:r="http://schemas.openxmlformats.org/officeDocument/2006/relationships" xmlns:p="http://schemas.openxmlformats.org/presentationml/2006/main">
+  <p:cSld>
+    <p:spTree>
+      <p:nvGrpSpPr>
+        <p:cNvPr id="1" name=""/>
+        <p:cNvGrpSpPr/>
+        <p:nvPr/>
+      </p:nvGrpSpPr>
+      <p:grpSpPr>
+        <a:xfrm>
+          <a:off x="0" y="0"/>
+          <a:ext cx="0" cy="0"/>
+          <a:chOff x="0" y="0"/>
+          <a:chExt cx="0" cy="0"/>
+        </a:xfrm>
+      </p:grpSpPr>
+      <p:sp>
+        <p:nvSpPr>
+          <p:cNvPr id="2" name="Title 1">
+            <a:extLst>
+              <a:ext uri="{FF2B5EF4-FFF2-40B4-BE49-F238E27FC236}">
+                <a16:creationId xmlns:a16="http://schemas.microsoft.com/office/drawing/2014/main" id="{8EE2F135-273E-4834-B6F0-3D0858F133DF}"/>
+              </a:ext>
+            </a:extLst>
+          </p:cNvPr>
+          <p:cNvSpPr>
+            <a:spLocks noGrp="1"/>
+          </p:cNvSpPr>
+          <p:nvPr>
+            <p:ph type="title"/>
+          </p:nvPr>
+        </p:nvSpPr>
+        <p:spPr>
+          <a:xfrm>
+            <a:off x="457200" y="274638"/>
+            <a:ext cx="8291264" cy="1143000"/>
+          </a:xfrm>
+        </p:spPr>
+        <p:txBody>
+          <a:bodyPr/>
+          <a:lstStyle/>
+          <a:p>
+            <a:r>
+              <a:rPr lang="en-CA" dirty="0"/>
+              <a:t>Bragg Gratings: FDTD Bloch Boundary</a:t>
+            </a:r>
+          </a:p>
+        </p:txBody>
+      </p:sp>
+      <p:sp>
+        <p:nvSpPr>
+          <p:cNvPr id="4" name="Slide Number Placeholder 3">
+            <a:extLst>
+              <a:ext uri="{FF2B5EF4-FFF2-40B4-BE49-F238E27FC236}">
+                <a16:creationId xmlns:a16="http://schemas.microsoft.com/office/drawing/2014/main" id="{181E9F38-6DC0-4C01-A41D-AB533D6FEA17}"/>
+              </a:ext>
+            </a:extLst>
+          </p:cNvPr>
+          <p:cNvSpPr>
+            <a:spLocks noGrp="1"/>
+          </p:cNvSpPr>
+          <p:nvPr>
+            <p:ph type="sldNum" sz="quarter" idx="12"/>
+          </p:nvPr>
+        </p:nvSpPr>
+        <p:spPr/>
+        <p:txBody>
+          <a:bodyPr/>
+          <a:lstStyle/>
+          <a:p>
+            <a:fld id="{17BB8376-F12B-CB44-BE0C-DBE0A170CA7C}" type="slidenum">
+              <a:rPr lang="en-US" altLang="zh-CN" smtClean="0"/>
+              <a:pPr/>
+              <a:t>12</a:t>
+            </a:fld>
+            <a:endParaRPr lang="en-US" altLang="zh-CN"/>
+          </a:p>
+        </p:txBody>
+      </p:sp>
+      <p:sp>
+        <p:nvSpPr>
+          <p:cNvPr id="6" name="Footer Placeholder 2">
+            <a:extLst>
+              <a:ext uri="{FF2B5EF4-FFF2-40B4-BE49-F238E27FC236}">
+                <a16:creationId xmlns:a16="http://schemas.microsoft.com/office/drawing/2014/main" id="{81E21CDC-8116-449C-AF50-F12DB1CAE886}"/>
+              </a:ext>
+            </a:extLst>
+          </p:cNvPr>
+          <p:cNvSpPr>
+            <a:spLocks noGrp="1"/>
+          </p:cNvSpPr>
+          <p:nvPr>
+            <p:ph type="ftr" sz="quarter" idx="11"/>
+          </p:nvPr>
+        </p:nvSpPr>
+        <p:spPr>
+          <a:xfrm>
+            <a:off x="7452320" y="0"/>
+            <a:ext cx="1691680" cy="365125"/>
+          </a:xfrm>
+        </p:spPr>
+        <p:txBody>
+          <a:bodyPr/>
+          <a:lstStyle/>
+          <a:p>
+            <a:r>
+              <a:rPr lang="en-US" altLang="zh-CN" dirty="0"/>
+              <a:t> M. Hammood ©2020</a:t>
+            </a:r>
+          </a:p>
+        </p:txBody>
+      </p:sp>
+      <p:sp>
+        <p:nvSpPr>
+          <p:cNvPr id="7" name="TextBox 6">
+            <a:extLst>
+              <a:ext uri="{FF2B5EF4-FFF2-40B4-BE49-F238E27FC236}">
+                <a16:creationId xmlns:a16="http://schemas.microsoft.com/office/drawing/2014/main" id="{9AC1B49E-B2DD-4EBF-8C05-7CEEC47B1267}"/>
+              </a:ext>
+            </a:extLst>
+          </p:cNvPr>
+          <p:cNvSpPr txBox="1"/>
+          <p:nvPr/>
+        </p:nvSpPr>
+        <p:spPr>
+          <a:xfrm>
+            <a:off x="107504" y="1250160"/>
+            <a:ext cx="6120680" cy="4216539"/>
+          </a:xfrm>
+          <a:prstGeom prst="rect">
+            <a:avLst/>
+          </a:prstGeom>
+          <a:noFill/>
+        </p:spPr>
+        <p:txBody>
+          <a:bodyPr wrap="square" rtlCol="0">
+            <a:spAutoFit/>
+          </a:bodyPr>
+          <a:lstStyle/>
+          <a:p>
+            <a:pPr marL="742950" lvl="1" indent="-285750">
+              <a:buFont typeface="Arial" panose="020B0604020202020204" pitchFamily="34" charset="0"/>
+              <a:buChar char="•"/>
+            </a:pPr>
+            <a:r>
+              <a:rPr lang="en-US" sz="1600" b="1" dirty="0">
+                <a:solidFill>
+                  <a:srgbClr val="17375E"/>
+                </a:solidFill>
+              </a:rPr>
+              <a:t>Uses FDTD solver:</a:t>
+            </a:r>
+          </a:p>
+          <a:p>
+            <a:pPr marL="1200150" lvl="2" indent="-285750">
+              <a:buFont typeface="Arial" panose="020B0604020202020204" pitchFamily="34" charset="0"/>
+              <a:buChar char="•"/>
+            </a:pPr>
+            <a:r>
+              <a:rPr lang="en-US" sz="1600" dirty="0">
+                <a:solidFill>
+                  <a:srgbClr val="17375E"/>
+                </a:solidFill>
+              </a:rPr>
+              <a:t>Simulating one unit cell of a grating over an infinite length.</a:t>
+            </a:r>
+          </a:p>
+          <a:p>
+            <a:pPr marL="1200150" lvl="2" indent="-285750">
+              <a:buFont typeface="Arial" panose="020B0604020202020204" pitchFamily="34" charset="0"/>
+              <a:buChar char="•"/>
+            </a:pPr>
+            <a:endParaRPr lang="en-US" sz="1200" b="1" dirty="0"/>
+          </a:p>
+          <a:p>
+            <a:pPr marL="1200150" lvl="2" indent="-285750">
+              <a:buFont typeface="Arial" panose="020B0604020202020204" pitchFamily="34" charset="0"/>
+              <a:buChar char="•"/>
+            </a:pPr>
+            <a:endParaRPr lang="en-US" sz="1600" dirty="0">
+              <a:solidFill>
+                <a:srgbClr val="17375E"/>
+              </a:solidFill>
+            </a:endParaRPr>
+          </a:p>
+          <a:p>
+            <a:pPr marL="742950" lvl="1" indent="-285750">
+              <a:buFont typeface="Arial" panose="020B0604020202020204" pitchFamily="34" charset="0"/>
+              <a:buChar char="•"/>
+            </a:pPr>
+            <a:r>
+              <a:rPr lang="en-US" sz="1600" b="1" dirty="0">
+                <a:solidFill>
+                  <a:srgbClr val="17375E"/>
+                </a:solidFill>
+              </a:rPr>
+              <a:t>Advantages:</a:t>
+            </a:r>
+          </a:p>
+          <a:p>
+            <a:pPr marL="1200150" lvl="2" indent="-285750">
+              <a:buFont typeface="Arial" panose="020B0604020202020204" pitchFamily="34" charset="0"/>
+              <a:buChar char="•"/>
+            </a:pPr>
+            <a:r>
+              <a:rPr lang="en-US" sz="1600" dirty="0">
+                <a:solidFill>
+                  <a:srgbClr val="17375E"/>
+                </a:solidFill>
+              </a:rPr>
+              <a:t>Relatively fast simulation with the most accurate results.</a:t>
+            </a:r>
+          </a:p>
+          <a:p>
+            <a:pPr marL="1200150" lvl="2" indent="-285750">
+              <a:buFont typeface="Arial" panose="020B0604020202020204" pitchFamily="34" charset="0"/>
+              <a:buChar char="•"/>
+            </a:pPr>
+            <a:endParaRPr lang="en-US" sz="1600" dirty="0">
+              <a:solidFill>
+                <a:srgbClr val="17375E"/>
+              </a:solidFill>
+            </a:endParaRPr>
+          </a:p>
+          <a:p>
+            <a:pPr marL="1200150" lvl="2" indent="-285750">
+              <a:buFont typeface="Arial" panose="020B0604020202020204" pitchFamily="34" charset="0"/>
+              <a:buChar char="•"/>
+            </a:pPr>
+            <a:r>
+              <a:rPr lang="en-US" sz="1600" dirty="0">
+                <a:solidFill>
+                  <a:srgbClr val="17375E"/>
+                </a:solidFill>
+              </a:rPr>
+              <a:t>Can be used to perform various parametric sweeps.</a:t>
+            </a:r>
+          </a:p>
+          <a:p>
+            <a:pPr marL="1200150" lvl="2" indent="-285750">
+              <a:buFont typeface="Arial" panose="020B0604020202020204" pitchFamily="34" charset="0"/>
+              <a:buChar char="•"/>
+            </a:pPr>
+            <a:endParaRPr lang="en-US" sz="1600" dirty="0">
+              <a:solidFill>
+                <a:srgbClr val="17375E"/>
+              </a:solidFill>
+            </a:endParaRPr>
+          </a:p>
+          <a:p>
+            <a:pPr marL="1200150" lvl="2" indent="-285750">
+              <a:buFont typeface="Arial" panose="020B0604020202020204" pitchFamily="34" charset="0"/>
+              <a:buChar char="•"/>
+            </a:pPr>
+            <a:endParaRPr lang="en-US" sz="1600" dirty="0">
+              <a:solidFill>
+                <a:srgbClr val="17375E"/>
+              </a:solidFill>
+            </a:endParaRPr>
+          </a:p>
+          <a:p>
+            <a:pPr marL="742950" lvl="1" indent="-285750">
+              <a:buFont typeface="Arial" panose="020B0604020202020204" pitchFamily="34" charset="0"/>
+              <a:buChar char="•"/>
+            </a:pPr>
+            <a:r>
+              <a:rPr lang="en-US" sz="1600" b="1" dirty="0">
+                <a:solidFill>
+                  <a:srgbClr val="17375E"/>
+                </a:solidFill>
+              </a:rPr>
+              <a:t>Disadvantages:</a:t>
+            </a:r>
+          </a:p>
+          <a:p>
+            <a:pPr marL="1200150" lvl="2" indent="-285750">
+              <a:buFont typeface="Arial" panose="020B0604020202020204" pitchFamily="34" charset="0"/>
+              <a:buChar char="•"/>
+            </a:pPr>
+            <a:r>
+              <a:rPr lang="en-US" sz="1600" dirty="0">
+                <a:solidFill>
+                  <a:srgbClr val="17375E"/>
+                </a:solidFill>
+              </a:rPr>
+              <a:t>Cannot simulate the output spectra of advanced </a:t>
+            </a:r>
+            <a:r>
+              <a:rPr lang="en-US" sz="1600" dirty="0" err="1">
+                <a:solidFill>
+                  <a:srgbClr val="17375E"/>
+                </a:solidFill>
+              </a:rPr>
+              <a:t>apodized</a:t>
+            </a:r>
+            <a:r>
+              <a:rPr lang="en-US" sz="1600" dirty="0">
+                <a:solidFill>
+                  <a:srgbClr val="17375E"/>
+                </a:solidFill>
+              </a:rPr>
+              <a:t> devices (directly).</a:t>
+            </a:r>
+          </a:p>
+          <a:p>
+            <a:pPr marL="1200150" lvl="2" indent="-285750">
+              <a:buFont typeface="Arial" panose="020B0604020202020204" pitchFamily="34" charset="0"/>
+              <a:buChar char="•"/>
+            </a:pPr>
+            <a:endParaRPr lang="en-US" sz="1600" dirty="0">
+              <a:solidFill>
+                <a:srgbClr val="17375E"/>
+              </a:solidFill>
+            </a:endParaRPr>
+          </a:p>
+          <a:p>
+            <a:pPr marL="1200150" lvl="2" indent="-285750">
+              <a:buFont typeface="Arial" panose="020B0604020202020204" pitchFamily="34" charset="0"/>
+              <a:buChar char="•"/>
+            </a:pPr>
+            <a:r>
+              <a:rPr lang="en-US" sz="1600" dirty="0">
+                <a:solidFill>
+                  <a:srgbClr val="17375E"/>
+                </a:solidFill>
+              </a:rPr>
+              <a:t>Does not show the output spectra of the device</a:t>
+            </a:r>
+          </a:p>
+        </p:txBody>
+      </p:sp>
+      <p:pic>
+        <p:nvPicPr>
+          <p:cNvPr id="3" name="Picture 2">
+            <a:extLst>
+              <a:ext uri="{FF2B5EF4-FFF2-40B4-BE49-F238E27FC236}">
+                <a16:creationId xmlns:a16="http://schemas.microsoft.com/office/drawing/2014/main" id="{AAD09C47-DDC9-4E62-B885-AA5047ADC8F7}"/>
+              </a:ext>
+            </a:extLst>
+          </p:cNvPr>
+          <p:cNvPicPr>
+            <a:picLocks noChangeAspect="1"/>
+          </p:cNvPicPr>
+          <p:nvPr/>
+        </p:nvPicPr>
+        <p:blipFill>
+          <a:blip r:embed="rId3"/>
+          <a:stretch>
+            <a:fillRect/>
+          </a:stretch>
+        </p:blipFill>
+        <p:spPr>
+          <a:xfrm>
+            <a:off x="6156176" y="1623079"/>
+            <a:ext cx="2961183" cy="4026171"/>
+          </a:xfrm>
+          <a:prstGeom prst="rect">
+            <a:avLst/>
+          </a:prstGeom>
+        </p:spPr>
+      </p:pic>
+    </p:spTree>
+    <p:extLst>
+      <p:ext uri="{BB962C8B-B14F-4D97-AF65-F5344CB8AC3E}">
+        <p14:creationId xmlns:p14="http://schemas.microsoft.com/office/powerpoint/2010/main" val="251088980"/>
+      </p:ext>
+    </p:extLst>
+  </p:cSld>
+  <p:clrMapOvr>
+    <a:masterClrMapping/>
+  </p:clrMapOvr>
+</p:sld>
+</file>
+
+<file path=ppt/slides/slide13.xml><?xml version="1.0" encoding="utf-8"?>
+<p:sld xmlns:a="http://schemas.openxmlformats.org/drawingml/2006/main" xmlns:r="http://schemas.openxmlformats.org/officeDocument/2006/relationships" xmlns:p="http://schemas.openxmlformats.org/presentationml/2006/main">
+  <p:cSld>
+    <p:spTree>
+      <p:nvGrpSpPr>
+        <p:cNvPr id="1" name=""/>
+        <p:cNvGrpSpPr/>
+        <p:nvPr/>
+      </p:nvGrpSpPr>
+      <p:grpSpPr>
+        <a:xfrm>
+          <a:off x="0" y="0"/>
+          <a:ext cx="0" cy="0"/>
+          <a:chOff x="0" y="0"/>
+          <a:chExt cx="0" cy="0"/>
+        </a:xfrm>
+      </p:grpSpPr>
+      <p:sp>
+        <p:nvSpPr>
+          <p:cNvPr id="2" name="Title 1">
+            <a:extLst>
+              <a:ext uri="{FF2B5EF4-FFF2-40B4-BE49-F238E27FC236}">
+                <a16:creationId xmlns:a16="http://schemas.microsoft.com/office/drawing/2014/main" id="{8EE2F135-273E-4834-B6F0-3D0858F133DF}"/>
+              </a:ext>
+            </a:extLst>
+          </p:cNvPr>
+          <p:cNvSpPr>
+            <a:spLocks noGrp="1"/>
+          </p:cNvSpPr>
+          <p:nvPr>
+            <p:ph type="title"/>
+          </p:nvPr>
+        </p:nvSpPr>
+        <p:spPr>
+          <a:xfrm>
+            <a:off x="457200" y="274638"/>
+            <a:ext cx="8291264" cy="1143000"/>
+          </a:xfrm>
+        </p:spPr>
+        <p:txBody>
+          <a:bodyPr/>
+          <a:lstStyle/>
+          <a:p>
+            <a:r>
+              <a:rPr lang="en-CA" dirty="0"/>
+              <a:t>Bragg Gratings: FDTD Bloch Boundary</a:t>
+            </a:r>
+          </a:p>
+        </p:txBody>
+      </p:sp>
+      <p:sp>
+        <p:nvSpPr>
+          <p:cNvPr id="4" name="Slide Number Placeholder 3">
+            <a:extLst>
+              <a:ext uri="{FF2B5EF4-FFF2-40B4-BE49-F238E27FC236}">
+                <a16:creationId xmlns:a16="http://schemas.microsoft.com/office/drawing/2014/main" id="{181E9F38-6DC0-4C01-A41D-AB533D6FEA17}"/>
+              </a:ext>
+            </a:extLst>
+          </p:cNvPr>
+          <p:cNvSpPr>
+            <a:spLocks noGrp="1"/>
+          </p:cNvSpPr>
+          <p:nvPr>
+            <p:ph type="sldNum" sz="quarter" idx="12"/>
+          </p:nvPr>
+        </p:nvSpPr>
+        <p:spPr/>
+        <p:txBody>
+          <a:bodyPr/>
+          <a:lstStyle/>
+          <a:p>
+            <a:fld id="{17BB8376-F12B-CB44-BE0C-DBE0A170CA7C}" type="slidenum">
+              <a:rPr lang="en-US" altLang="zh-CN" smtClean="0"/>
+              <a:pPr/>
+              <a:t>13</a:t>
+            </a:fld>
+            <a:endParaRPr lang="en-US" altLang="zh-CN"/>
+          </a:p>
+        </p:txBody>
+      </p:sp>
+      <p:sp>
+        <p:nvSpPr>
+          <p:cNvPr id="6" name="Footer Placeholder 2">
+            <a:extLst>
+              <a:ext uri="{FF2B5EF4-FFF2-40B4-BE49-F238E27FC236}">
+                <a16:creationId xmlns:a16="http://schemas.microsoft.com/office/drawing/2014/main" id="{81E21CDC-8116-449C-AF50-F12DB1CAE886}"/>
+              </a:ext>
+            </a:extLst>
+          </p:cNvPr>
+          <p:cNvSpPr>
+            <a:spLocks noGrp="1"/>
+          </p:cNvSpPr>
+          <p:nvPr>
+            <p:ph type="ftr" sz="quarter" idx="11"/>
+          </p:nvPr>
+        </p:nvSpPr>
+        <p:spPr>
+          <a:xfrm>
+            <a:off x="7452320" y="0"/>
+            <a:ext cx="1691680" cy="365125"/>
+          </a:xfrm>
+        </p:spPr>
+        <p:txBody>
+          <a:bodyPr/>
+          <a:lstStyle/>
+          <a:p>
+            <a:r>
+              <a:rPr lang="en-US" altLang="zh-CN" dirty="0"/>
+              <a:t> M. Hammood ©2020</a:t>
+            </a:r>
+          </a:p>
+        </p:txBody>
+      </p:sp>
+      <p:sp>
+        <p:nvSpPr>
+          <p:cNvPr id="7" name="TextBox 6">
+            <a:extLst>
+              <a:ext uri="{FF2B5EF4-FFF2-40B4-BE49-F238E27FC236}">
+                <a16:creationId xmlns:a16="http://schemas.microsoft.com/office/drawing/2014/main" id="{9AC1B49E-B2DD-4EBF-8C05-7CEEC47B1267}"/>
+              </a:ext>
+            </a:extLst>
+          </p:cNvPr>
+          <p:cNvSpPr txBox="1"/>
+          <p:nvPr/>
+        </p:nvSpPr>
+        <p:spPr>
+          <a:xfrm>
+            <a:off x="107504" y="1250160"/>
+            <a:ext cx="8640960" cy="2062103"/>
+          </a:xfrm>
+          <a:prstGeom prst="rect">
+            <a:avLst/>
+          </a:prstGeom>
+          <a:noFill/>
+        </p:spPr>
+        <p:txBody>
+          <a:bodyPr wrap="square" rtlCol="0">
+            <a:spAutoFit/>
+          </a:bodyPr>
+          <a:lstStyle/>
+          <a:p>
+            <a:pPr marL="742950" lvl="1" indent="-285750">
+              <a:buFont typeface="Arial" panose="020B0604020202020204" pitchFamily="34" charset="0"/>
+              <a:buChar char="•"/>
+            </a:pPr>
+            <a:r>
+              <a:rPr lang="en-US" sz="1600" dirty="0">
+                <a:solidFill>
+                  <a:srgbClr val="17375E"/>
+                </a:solidFill>
+              </a:rPr>
+              <a:t>Two examples provided under ‘</a:t>
+            </a:r>
+            <a:r>
+              <a:rPr lang="en-US" sz="1600" b="1" dirty="0" err="1">
+                <a:solidFill>
+                  <a:srgbClr val="17375E"/>
+                </a:solidFill>
+              </a:rPr>
+              <a:t>Bandstructure</a:t>
+            </a:r>
+            <a:r>
+              <a:rPr lang="en-US" sz="1600" dirty="0">
+                <a:solidFill>
+                  <a:srgbClr val="17375E"/>
+                </a:solidFill>
+              </a:rPr>
+              <a:t>’</a:t>
+            </a:r>
+          </a:p>
+          <a:p>
+            <a:pPr marL="1200150" lvl="2" indent="-285750">
+              <a:buFont typeface="Arial" panose="020B0604020202020204" pitchFamily="34" charset="0"/>
+              <a:buChar char="•"/>
+            </a:pPr>
+            <a:r>
+              <a:rPr lang="en-US" sz="1600" b="1" dirty="0">
+                <a:solidFill>
+                  <a:srgbClr val="17375E"/>
+                </a:solidFill>
+              </a:rPr>
+              <a:t>Script-based: </a:t>
+            </a:r>
+            <a:r>
+              <a:rPr lang="en-US" sz="1600" dirty="0">
+                <a:solidFill>
+                  <a:srgbClr val="17375E"/>
+                </a:solidFill>
+              </a:rPr>
+              <a:t>run ‘</a:t>
+            </a:r>
+            <a:r>
+              <a:rPr lang="en-US" sz="1600" dirty="0" err="1">
+                <a:solidFill>
+                  <a:srgbClr val="17375E"/>
+                </a:solidFill>
+              </a:rPr>
+              <a:t>MAIN_Bandstructure.lsf</a:t>
+            </a:r>
+            <a:r>
+              <a:rPr lang="en-US" sz="1600" dirty="0">
+                <a:solidFill>
+                  <a:srgbClr val="17375E"/>
+                </a:solidFill>
+              </a:rPr>
+              <a:t>’ using FDTD script window with simulation and physical parameters. This is a “GUI”-less approach that will setup the simulation for you.</a:t>
+            </a:r>
+          </a:p>
+          <a:p>
+            <a:pPr marL="1200150" lvl="2" indent="-285750">
+              <a:buFont typeface="Arial" panose="020B0604020202020204" pitchFamily="34" charset="0"/>
+              <a:buChar char="•"/>
+            </a:pPr>
+            <a:endParaRPr lang="en-US" sz="1600" b="1" dirty="0">
+              <a:solidFill>
+                <a:srgbClr val="17375E"/>
+              </a:solidFill>
+            </a:endParaRPr>
+          </a:p>
+          <a:p>
+            <a:pPr marL="1200150" lvl="2" indent="-285750">
+              <a:buFont typeface="Arial" panose="020B0604020202020204" pitchFamily="34" charset="0"/>
+              <a:buChar char="•"/>
+            </a:pPr>
+            <a:r>
+              <a:rPr lang="en-US" sz="1600" b="1" dirty="0">
+                <a:solidFill>
+                  <a:srgbClr val="17375E"/>
+                </a:solidFill>
+              </a:rPr>
+              <a:t>Project-based: </a:t>
+            </a:r>
+            <a:r>
+              <a:rPr lang="en-US" sz="1600" dirty="0">
+                <a:solidFill>
+                  <a:srgbClr val="17375E"/>
+                </a:solidFill>
+              </a:rPr>
+              <a:t>open “</a:t>
+            </a:r>
+            <a:r>
+              <a:rPr lang="en-US" sz="1600" dirty="0" err="1">
+                <a:solidFill>
+                  <a:srgbClr val="17375E"/>
+                </a:solidFill>
+              </a:rPr>
+              <a:t>Bragg_bandstructure.fsp</a:t>
+            </a:r>
+            <a:r>
+              <a:rPr lang="en-US" sz="1600" dirty="0">
+                <a:solidFill>
+                  <a:srgbClr val="17375E"/>
+                </a:solidFill>
+              </a:rPr>
+              <a:t>’ using FDTD and configure the simulation settings under “model” and physical settings under “Bragg” objects.</a:t>
+            </a:r>
+          </a:p>
+          <a:p>
+            <a:pPr marL="1657350" lvl="3" indent="-285750">
+              <a:buFont typeface="Arial" panose="020B0604020202020204" pitchFamily="34" charset="0"/>
+              <a:buChar char="•"/>
+            </a:pPr>
+            <a:r>
+              <a:rPr lang="en-US" sz="1600" dirty="0">
+                <a:solidFill>
+                  <a:srgbClr val="17375E"/>
+                </a:solidFill>
+              </a:rPr>
+              <a:t>Sample parametric sweeps were setup in this project as an example.</a:t>
+            </a:r>
+          </a:p>
+        </p:txBody>
+      </p:sp>
+      <p:pic>
+        <p:nvPicPr>
+          <p:cNvPr id="3" name="Picture 2">
+            <a:extLst>
+              <a:ext uri="{FF2B5EF4-FFF2-40B4-BE49-F238E27FC236}">
+                <a16:creationId xmlns:a16="http://schemas.microsoft.com/office/drawing/2014/main" id="{CDF80598-8983-4D6F-8D1C-A256618AB41C}"/>
+              </a:ext>
+            </a:extLst>
+          </p:cNvPr>
+          <p:cNvPicPr>
+            <a:picLocks noChangeAspect="1"/>
+          </p:cNvPicPr>
+          <p:nvPr/>
+        </p:nvPicPr>
+        <p:blipFill>
+          <a:blip r:embed="rId3"/>
+          <a:stretch>
+            <a:fillRect/>
+          </a:stretch>
+        </p:blipFill>
+        <p:spPr>
+          <a:xfrm>
+            <a:off x="4609501" y="3429000"/>
+            <a:ext cx="4535488" cy="2596536"/>
+          </a:xfrm>
+          <a:prstGeom prst="rect">
+            <a:avLst/>
+          </a:prstGeom>
+        </p:spPr>
+      </p:pic>
+      <p:pic>
+        <p:nvPicPr>
+          <p:cNvPr id="8" name="Picture 7">
+            <a:extLst>
+              <a:ext uri="{FF2B5EF4-FFF2-40B4-BE49-F238E27FC236}">
+                <a16:creationId xmlns:a16="http://schemas.microsoft.com/office/drawing/2014/main" id="{52E962C7-C9D5-4E1B-A2DE-B2EE148AF758}"/>
+              </a:ext>
+            </a:extLst>
+          </p:cNvPr>
+          <p:cNvPicPr>
+            <a:picLocks noChangeAspect="1"/>
+          </p:cNvPicPr>
+          <p:nvPr/>
+        </p:nvPicPr>
+        <p:blipFill>
+          <a:blip r:embed="rId4"/>
+          <a:stretch>
+            <a:fillRect/>
+          </a:stretch>
+        </p:blipFill>
+        <p:spPr>
+          <a:xfrm>
+            <a:off x="0" y="3449282"/>
+            <a:ext cx="3137658" cy="2592286"/>
+          </a:xfrm>
+          <a:prstGeom prst="rect">
+            <a:avLst/>
+          </a:prstGeom>
+        </p:spPr>
+      </p:pic>
+      <p:cxnSp>
+        <p:nvCxnSpPr>
+          <p:cNvPr id="10" name="Straight Arrow Connector 9">
+            <a:extLst>
+              <a:ext uri="{FF2B5EF4-FFF2-40B4-BE49-F238E27FC236}">
+                <a16:creationId xmlns:a16="http://schemas.microsoft.com/office/drawing/2014/main" id="{C0662DD6-40BA-4A67-A7FF-480775F4D5A0}"/>
+              </a:ext>
+            </a:extLst>
+          </p:cNvPr>
+          <p:cNvCxnSpPr/>
+          <p:nvPr/>
+        </p:nvCxnSpPr>
+        <p:spPr>
+          <a:xfrm flipH="1">
+            <a:off x="3275856" y="4509120"/>
+            <a:ext cx="1512168" cy="0"/>
+          </a:xfrm>
+          <a:prstGeom prst="straightConnector1">
+            <a:avLst/>
+          </a:prstGeom>
+          <a:ln>
+            <a:tailEnd type="triangle"/>
+          </a:ln>
+        </p:spPr>
+        <p:style>
+          <a:lnRef idx="1">
+            <a:schemeClr val="accent1"/>
+          </a:lnRef>
+          <a:fillRef idx="0">
+            <a:schemeClr val="accent1"/>
+          </a:fillRef>
+          <a:effectRef idx="0">
+            <a:schemeClr val="accent1"/>
+          </a:effectRef>
+          <a:fontRef idx="minor">
+            <a:schemeClr val="tx1"/>
+          </a:fontRef>
+        </p:style>
+      </p:cxnSp>
+    </p:spTree>
+    <p:extLst>
+      <p:ext uri="{BB962C8B-B14F-4D97-AF65-F5344CB8AC3E}">
+        <p14:creationId xmlns:p14="http://schemas.microsoft.com/office/powerpoint/2010/main" val="999912109"/>
       </p:ext>
     </p:extLst>
   </p:cSld>
@@ -16699,7 +17734,7 @@
         <p:spPr>
           <a:xfrm>
             <a:off x="107504" y="1250160"/>
-            <a:ext cx="9036496" cy="4524315"/>
+            <a:ext cx="9036496" cy="4278094"/>
           </a:xfrm>
           <a:prstGeom prst="rect">
             <a:avLst/>
@@ -16736,21 +17771,8 @@
                   <a:srgbClr val="17375E"/>
                 </a:solidFill>
               </a:rPr>
-              <a:t>Theoretical approach: Transfer-Matrix </a:t>
-            </a:r>
-            <a:r>
-              <a:rPr lang="en-US" sz="1600" dirty="0" smtClean="0">
-                <a:solidFill>
-                  <a:srgbClr val="17375E"/>
-                </a:solidFill>
-              </a:rPr>
-              <a:t>Method (TMM)</a:t>
-            </a:r>
-            <a:endParaRPr lang="en-US" sz="1600" dirty="0">
-              <a:solidFill>
-                <a:srgbClr val="17375E"/>
-              </a:solidFill>
-            </a:endParaRPr>
+              <a:t>Theoretical approach: Transfer-Matrix Method (TMM)</a:t>
+            </a:r>
           </a:p>
           <a:p>
             <a:pPr marL="1200150" lvl="2" indent="-285750">
@@ -16763,21 +17785,8 @@
                   <a:srgbClr val="17375E"/>
                 </a:solidFill>
               </a:rPr>
-              <a:t>Theoretical approach: Coupled-mode </a:t>
-            </a:r>
-            <a:r>
-              <a:rPr lang="en-US" sz="1600" dirty="0" smtClean="0">
-                <a:solidFill>
-                  <a:srgbClr val="17375E"/>
-                </a:solidFill>
-              </a:rPr>
-              <a:t>theory (CMT)</a:t>
-            </a:r>
-            <a:endParaRPr lang="en-US" sz="1600" dirty="0">
-              <a:solidFill>
-                <a:srgbClr val="17375E"/>
-              </a:solidFill>
-            </a:endParaRPr>
+              <a:t>Theoretical approach: Coupled-mode theory (CMT)</a:t>
+            </a:r>
           </a:p>
           <a:p>
             <a:pPr marL="1657350" lvl="3" indent="-285750">
@@ -16804,21 +17813,8 @@
                   <a:srgbClr val="17375E"/>
                 </a:solidFill>
               </a:rPr>
-              <a:t>Simulation: Lumerical </a:t>
-            </a:r>
-            <a:r>
-              <a:rPr lang="en-US" sz="1600" dirty="0" smtClean="0">
-                <a:solidFill>
-                  <a:srgbClr val="17375E"/>
-                </a:solidFill>
-              </a:rPr>
-              <a:t>EME</a:t>
-            </a:r>
-            <a:endParaRPr lang="en-US" sz="1600" dirty="0">
-              <a:solidFill>
-                <a:srgbClr val="17375E"/>
-              </a:solidFill>
-            </a:endParaRPr>
+              <a:t>Simulation: Lumerical EME</a:t>
+            </a:r>
           </a:p>
           <a:p>
             <a:pPr marL="1200150" lvl="2" indent="-285750">
@@ -16831,21 +17827,24 @@
                   <a:srgbClr val="17375E"/>
                 </a:solidFill>
               </a:rPr>
-              <a:t>Simulation: Lumerical 3D </a:t>
-            </a:r>
-            <a:r>
-              <a:rPr lang="en-US" sz="1600" dirty="0" smtClean="0">
+              <a:t>Simulation: </a:t>
+            </a:r>
+            <a:r>
+              <a:rPr lang="en-US" sz="1600" dirty="0" err="1">
                 <a:solidFill>
                   <a:srgbClr val="17375E"/>
                 </a:solidFill>
               </a:rPr>
-              <a:t>FDTD</a:t>
-            </a:r>
-            <a:endParaRPr lang="en-US" sz="1600" dirty="0">
-              <a:solidFill>
-                <a:srgbClr val="17375E"/>
-              </a:solidFill>
-            </a:endParaRPr>
+              <a:t>Lumerical</a:t>
+            </a:r>
+            <a:r>
+              <a:rPr lang="en-US" sz="1600" dirty="0">
+                <a:solidFill>
+                  <a:srgbClr val="17375E"/>
+                </a:solidFill>
+              </a:rPr>
+              <a:t> 3D/2D FDTD</a:t>
+            </a:r>
           </a:p>
           <a:p>
             <a:pPr marL="1200150" lvl="2" indent="-285750">
@@ -16858,51 +17857,8 @@
                   <a:srgbClr val="17375E"/>
                 </a:solidFill>
               </a:rPr>
-              <a:t>Simulation: Lumerical 2D </a:t>
-            </a:r>
-            <a:r>
-              <a:rPr lang="en-US" sz="1600" dirty="0" smtClean="0">
-                <a:solidFill>
-                  <a:srgbClr val="17375E"/>
-                </a:solidFill>
-              </a:rPr>
-              <a:t>FDTD</a:t>
-            </a:r>
-          </a:p>
-          <a:p>
-            <a:pPr marL="1200150" lvl="2" indent="-285750">
-              <a:buFont typeface="Arial" panose="020B0604020202020204" pitchFamily="34" charset="0"/>
-              <a:buChar char="•"/>
-            </a:pPr>
-            <a:r>
-              <a:rPr lang="en-US" sz="1600" dirty="0" smtClean="0">
-                <a:solidFill>
-                  <a:srgbClr val="17375E"/>
-                </a:solidFill>
-              </a:rPr>
-              <a:t>Simulation </a:t>
-            </a:r>
-            <a:r>
-              <a:rPr lang="en-US" sz="1600" dirty="0">
-                <a:solidFill>
-                  <a:srgbClr val="17375E"/>
-                </a:solidFill>
-              </a:rPr>
-              <a:t>+ Theory: Lumerical </a:t>
-            </a:r>
-            <a:r>
-              <a:rPr lang="en-US" sz="1600" dirty="0" smtClean="0">
-                <a:solidFill>
-                  <a:srgbClr val="17375E"/>
-                </a:solidFill>
-              </a:rPr>
-              <a:t>FDTD Band-structure</a:t>
-            </a:r>
-            <a:endParaRPr lang="en-US" sz="1600" dirty="0">
-              <a:solidFill>
-                <a:srgbClr val="17375E"/>
-              </a:solidFill>
-            </a:endParaRPr>
+              <a:t>Simulation + Theory: Lumerical FDTD Band-structure</a:t>
+            </a:r>
           </a:p>
           <a:p>
             <a:pPr marL="1200150" lvl="2" indent="-285750">
@@ -16982,15 +17938,7 @@
                   <a:srgbClr val="17375E"/>
                 </a:solidFill>
               </a:rPr>
-              <a:t>Compact model generation and full-simulation </a:t>
-            </a:r>
-            <a:r>
-              <a:rPr lang="en-US" sz="1600" dirty="0" smtClean="0">
-                <a:solidFill>
-                  <a:srgbClr val="17375E"/>
-                </a:solidFill>
-              </a:rPr>
-              <a:t>flow</a:t>
+              <a:t>Compact model generation and full-simulation flow</a:t>
             </a:r>
           </a:p>
           <a:p>
@@ -17010,7 +17958,7 @@
               <a:buChar char="•"/>
             </a:pPr>
             <a:r>
-              <a:rPr lang="en-US" sz="1600" b="1" dirty="0" smtClean="0">
+              <a:rPr lang="en-US" sz="1600" b="1" dirty="0">
                 <a:solidFill>
                   <a:srgbClr val="17375E"/>
                 </a:solidFill>
@@ -17024,7 +17972,7 @@
               <a:buChar char="•"/>
             </a:pPr>
             <a:r>
-              <a:rPr lang="en-US" sz="1600" dirty="0" smtClean="0">
+              <a:rPr lang="en-US" sz="1600" dirty="0">
                 <a:solidFill>
                   <a:srgbClr val="17375E"/>
                 </a:solidFill>
@@ -17171,54 +18119,108 @@
           </a:p>
         </p:txBody>
       </p:sp>
-      <p:sp>
-        <p:nvSpPr>
-          <p:cNvPr id="10" name="TextBox 9">
+      <p:pic>
+        <p:nvPicPr>
+          <p:cNvPr id="3" name="Picture 2">
             <a:extLst>
               <a:ext uri="{FF2B5EF4-FFF2-40B4-BE49-F238E27FC236}">
-                <a16:creationId xmlns:a16="http://schemas.microsoft.com/office/drawing/2014/main" id="{9AC1B49E-B2DD-4EBF-8C05-7CEEC47B1267}"/>
+                <a16:creationId xmlns:a16="http://schemas.microsoft.com/office/drawing/2014/main" id="{3DC6D0B9-08A5-4647-BC95-9972E05925CA}"/>
               </a:ext>
             </a:extLst>
           </p:cNvPr>
-          <p:cNvSpPr txBox="1"/>
+          <p:cNvPicPr>
+            <a:picLocks noChangeAspect="1"/>
+          </p:cNvPicPr>
           <p:nvPr/>
-        </p:nvSpPr>
+        </p:nvPicPr>
+        <p:blipFill>
+          <a:blip r:embed="rId3"/>
+          <a:stretch>
+            <a:fillRect/>
+          </a:stretch>
+        </p:blipFill>
         <p:spPr>
           <a:xfrm>
-            <a:off x="107504" y="1250160"/>
-            <a:ext cx="9036496" cy="338554"/>
+            <a:off x="340855" y="1188684"/>
+            <a:ext cx="3278672" cy="2829310"/>
           </a:xfrm>
           <a:prstGeom prst="rect">
             <a:avLst/>
           </a:prstGeom>
-          <a:noFill/>
         </p:spPr>
-        <p:txBody>
-          <a:bodyPr wrap="square" rtlCol="0">
-            <a:spAutoFit/>
-          </a:bodyPr>
-          <a:lstStyle/>
-          <a:p>
-            <a:pPr marL="742950" lvl="1" indent="-285750">
-              <a:buFont typeface="Arial" panose="020B0604020202020204" pitchFamily="34" charset="0"/>
-              <a:buChar char="•"/>
-            </a:pPr>
-            <a:r>
-              <a:rPr lang="en-US" sz="1600" dirty="0" smtClean="0">
-                <a:solidFill>
-                  <a:srgbClr val="17375E"/>
-                </a:solidFill>
-              </a:rPr>
-              <a:t>Explain transfer matrix method</a:t>
-            </a:r>
-            <a:endParaRPr lang="en-US" sz="1600" dirty="0">
-              <a:solidFill>
-                <a:srgbClr val="17375E"/>
-              </a:solidFill>
-            </a:endParaRPr>
-          </a:p>
-        </p:txBody>
-      </p:sp>
+      </p:pic>
+      <p:pic>
+        <p:nvPicPr>
+          <p:cNvPr id="5" name="Picture 4">
+            <a:extLst>
+              <a:ext uri="{FF2B5EF4-FFF2-40B4-BE49-F238E27FC236}">
+                <a16:creationId xmlns:a16="http://schemas.microsoft.com/office/drawing/2014/main" id="{A5C1CDD8-F795-423A-87A4-532226C0074D}"/>
+              </a:ext>
+            </a:extLst>
+          </p:cNvPr>
+          <p:cNvPicPr>
+            <a:picLocks noChangeAspect="1"/>
+          </p:cNvPicPr>
+          <p:nvPr/>
+        </p:nvPicPr>
+        <p:blipFill>
+          <a:blip r:embed="rId4"/>
+          <a:stretch>
+            <a:fillRect/>
+          </a:stretch>
+        </p:blipFill>
+        <p:spPr>
+          <a:xfrm>
+            <a:off x="0" y="4437112"/>
+            <a:ext cx="4015638" cy="1595774"/>
+          </a:xfrm>
+          <a:prstGeom prst="rect">
+            <a:avLst/>
+          </a:prstGeom>
+        </p:spPr>
+      </p:pic>
+      <p:cxnSp>
+        <p:nvCxnSpPr>
+          <p:cNvPr id="8" name="Straight Arrow Connector 7">
+            <a:extLst>
+              <a:ext uri="{FF2B5EF4-FFF2-40B4-BE49-F238E27FC236}">
+                <a16:creationId xmlns:a16="http://schemas.microsoft.com/office/drawing/2014/main" id="{842AAE42-C7F9-461B-A2F2-F5B92E33533D}"/>
+              </a:ext>
+            </a:extLst>
+          </p:cNvPr>
+          <p:cNvCxnSpPr/>
+          <p:nvPr/>
+        </p:nvCxnSpPr>
+        <p:spPr>
+          <a:xfrm>
+            <a:off x="1980191" y="3789040"/>
+            <a:ext cx="0" cy="735084"/>
+          </a:xfrm>
+          <a:prstGeom prst="straightConnector1">
+            <a:avLst/>
+          </a:prstGeom>
+          <a:ln w="28575">
+            <a:solidFill>
+              <a:schemeClr val="tx2"/>
+            </a:solidFill>
+            <a:tailEnd type="triangle"/>
+          </a:ln>
+        </p:spPr>
+        <p:style>
+          <a:lnRef idx="1">
+            <a:schemeClr val="accent1"/>
+          </a:lnRef>
+          <a:fillRef idx="0">
+            <a:schemeClr val="accent1"/>
+          </a:fillRef>
+          <a:effectRef idx="0">
+            <a:schemeClr val="accent1"/>
+          </a:effectRef>
+          <a:fontRef idx="minor">
+            <a:schemeClr val="tx1"/>
+          </a:fontRef>
+        </p:style>
+      </p:cxnSp>
     </p:spTree>
     <p:extLst>
       <p:ext uri="{BB962C8B-B14F-4D97-AF65-F5344CB8AC3E}">
@@ -17360,7 +18362,7 @@
         <p:spPr>
           <a:xfrm>
             <a:off x="107504" y="1250160"/>
-            <a:ext cx="9036496" cy="4170372"/>
+            <a:ext cx="9036496" cy="4770537"/>
           </a:xfrm>
           <a:prstGeom prst="rect">
             <a:avLst/>
@@ -17378,51 +18380,28 @@
               <a:buChar char="•"/>
             </a:pPr>
             <a:r>
-              <a:rPr lang="en-US" sz="900" dirty="0" smtClean="0">
+              <a:rPr lang="en-US" sz="1600" b="1" dirty="0">
                 <a:solidFill>
                   <a:srgbClr val="17375E"/>
                 </a:solidFill>
               </a:rPr>
-              <a:t>Available: </a:t>
-            </a:r>
-            <a:r>
-              <a:rPr lang="en-US" sz="900" dirty="0">
+              <a:t>Available:</a:t>
+            </a:r>
+            <a:r>
+              <a:rPr lang="en-US" sz="1600" dirty="0">
+                <a:solidFill>
+                  <a:srgbClr val="17375E"/>
+                </a:solidFill>
+              </a:rPr>
+              <a:t> </a:t>
+            </a:r>
+            <a:r>
+              <a:rPr lang="en-US" sz="1600" dirty="0">
                 <a:hlinkClick r:id="rId3"/>
               </a:rPr>
-              <a:t>https://</a:t>
-            </a:r>
-            <a:r>
-              <a:rPr lang="en-US" sz="900" dirty="0" smtClean="0">
-                <a:hlinkClick r:id="rId3"/>
-              </a:rPr>
-              <a:t>github.com/mustafacc/SiEPIC_Photonics_Package/blob/master/SiEPIC_Photonics_Package/solvers_simulators/bragg_tmm/bragg_tmm.py</a:t>
-            </a:r>
-            <a:endParaRPr lang="en-US" sz="900" dirty="0" smtClean="0"/>
-          </a:p>
-          <a:p>
-            <a:pPr marL="742950" lvl="1" indent="-285750">
-              <a:buFont typeface="Arial" panose="020B0604020202020204" pitchFamily="34" charset="0"/>
-              <a:buChar char="•"/>
-            </a:pPr>
-            <a:endParaRPr lang="en-US" sz="1600" dirty="0" smtClean="0">
-              <a:solidFill>
-                <a:srgbClr val="17375E"/>
-              </a:solidFill>
-            </a:endParaRPr>
-          </a:p>
-          <a:p>
-            <a:pPr marL="742950" lvl="1" indent="-285750">
-              <a:buFont typeface="Arial" panose="020B0604020202020204" pitchFamily="34" charset="0"/>
-              <a:buChar char="•"/>
-            </a:pPr>
-            <a:r>
-              <a:rPr lang="en-US" sz="1600" dirty="0" smtClean="0">
-                <a:solidFill>
-                  <a:srgbClr val="17375E"/>
-                </a:solidFill>
-              </a:rPr>
-              <a:t>Handy tool to quickly model phase-shifted Bragg gratings</a:t>
-            </a:r>
+              <a:t>https://github.com/mustafacc/SiEPIC_Photonics_Package/blob/master/SiEPIC_Photonics_Package/solvers_simulators/bragg_tmm/bragg_tmm.py</a:t>
+            </a:r>
+            <a:endParaRPr lang="en-US" sz="1600" dirty="0"/>
           </a:p>
           <a:p>
             <a:pPr marL="742950" lvl="1" indent="-285750">
@@ -17441,7 +18420,32 @@
               <a:buChar char="•"/>
             </a:pPr>
             <a:r>
-              <a:rPr lang="en-US" sz="1600" dirty="0" smtClean="0">
+              <a:rPr lang="en-US" sz="1600" dirty="0">
+                <a:solidFill>
+                  <a:srgbClr val="17375E"/>
+                </a:solidFill>
+              </a:rPr>
+              <a:t>Handy tool to quickly model phase-shifted Bragg gratings</a:t>
+            </a:r>
+          </a:p>
+          <a:p>
+            <a:pPr marL="742950" lvl="1" indent="-285750">
+              <a:buFont typeface="Arial" panose="020B0604020202020204" pitchFamily="34" charset="0"/>
+              <a:buChar char="•"/>
+            </a:pPr>
+            <a:endParaRPr lang="en-US" sz="1600" dirty="0">
+              <a:solidFill>
+                <a:srgbClr val="17375E"/>
+              </a:solidFill>
+            </a:endParaRPr>
+          </a:p>
+          <a:p>
+            <a:pPr marL="742950" lvl="1" indent="-285750">
+              <a:buFont typeface="Arial" panose="020B0604020202020204" pitchFamily="34" charset="0"/>
+              <a:buChar char="•"/>
+            </a:pPr>
+            <a:r>
+              <a:rPr lang="en-US" sz="1600" b="1" dirty="0">
                 <a:solidFill>
                   <a:srgbClr val="17375E"/>
                 </a:solidFill>
@@ -17455,12 +18459,12 @@
               <a:buChar char="•"/>
             </a:pPr>
             <a:r>
-              <a:rPr lang="en-US" sz="1600" dirty="0" smtClean="0">
+              <a:rPr lang="en-US" sz="1600" dirty="0">
                 <a:solidFill>
                   <a:srgbClr val="17375E"/>
                 </a:solidFill>
               </a:rPr>
-              <a:t>Waveguides compact models (effective indices fits n(</a:t>
+              <a:t>Waveguides compact models (effective indices fits, n(</a:t>
             </a:r>
             <a:r>
               <a:rPr lang="el-GR" sz="1600" dirty="0">
@@ -17471,7 +18475,7 @@
               <a:t>λ</a:t>
             </a:r>
             <a:r>
-              <a:rPr lang="en-US" sz="1600" dirty="0" smtClean="0">
+              <a:rPr lang="en-US" sz="1600" dirty="0">
                 <a:solidFill>
                   <a:srgbClr val="17375E"/>
                 </a:solidFill>
@@ -17485,7 +18489,7 @@
               <a:buChar char="•"/>
             </a:pPr>
             <a:r>
-              <a:rPr lang="en-US" sz="1600" dirty="0" smtClean="0">
+              <a:rPr lang="en-US" sz="1600" dirty="0">
                 <a:solidFill>
                   <a:srgbClr val="17375E"/>
                 </a:solidFill>
@@ -17499,7 +18503,7 @@
               <a:buChar char="•"/>
             </a:pPr>
             <a:r>
-              <a:rPr lang="en-US" sz="1600" dirty="0" smtClean="0">
+              <a:rPr lang="en-US" sz="1600" dirty="0">
                 <a:solidFill>
                   <a:srgbClr val="17375E"/>
                 </a:solidFill>
@@ -17513,7 +18517,7 @@
               <a:buChar char="•"/>
             </a:pPr>
             <a:r>
-              <a:rPr lang="en-US" sz="1600" dirty="0" smtClean="0">
+              <a:rPr lang="en-US" sz="1600" dirty="0">
                 <a:solidFill>
                   <a:srgbClr val="17375E"/>
                 </a:solidFill>
@@ -17538,7 +18542,7 @@
               <a:buChar char="•"/>
             </a:pPr>
             <a:r>
-              <a:rPr lang="en-US" sz="1600" dirty="0" smtClean="0">
+              <a:rPr lang="en-US" sz="1600" b="1" dirty="0">
                 <a:solidFill>
                   <a:srgbClr val="17375E"/>
                 </a:solidFill>
@@ -17552,7 +18556,7 @@
               <a:buChar char="•"/>
             </a:pPr>
             <a:r>
-              <a:rPr lang="en-US" sz="1600" dirty="0" smtClean="0">
+              <a:rPr lang="en-US" sz="1600" dirty="0">
                 <a:solidFill>
                   <a:srgbClr val="17375E"/>
                 </a:solidFill>
@@ -17566,7 +18570,7 @@
               <a:buChar char="•"/>
             </a:pPr>
             <a:r>
-              <a:rPr lang="en-US" sz="1600" dirty="0" smtClean="0">
+              <a:rPr lang="en-US" sz="1600" dirty="0">
                 <a:solidFill>
                   <a:srgbClr val="17375E"/>
                 </a:solidFill>
@@ -17580,7 +18584,7 @@
               <a:buChar char="•"/>
             </a:pPr>
             <a:r>
-              <a:rPr lang="en-US" sz="1600" dirty="0" smtClean="0">
+              <a:rPr lang="en-US" sz="1600" dirty="0">
                 <a:solidFill>
                   <a:srgbClr val="17375E"/>
                 </a:solidFill>
@@ -17588,7 +18592,7 @@
               <a:t>Can simulate complex device profiles (</a:t>
             </a:r>
             <a:r>
-              <a:rPr lang="en-US" sz="1600" dirty="0" err="1" smtClean="0">
+              <a:rPr lang="en-US" sz="1600" dirty="0" err="1">
                 <a:solidFill>
                   <a:srgbClr val="17375E"/>
                 </a:solidFill>
@@ -17596,7 +18600,7 @@
               <a:t>apodized</a:t>
             </a:r>
             <a:r>
-              <a:rPr lang="en-US" sz="1600" dirty="0" smtClean="0">
+              <a:rPr lang="en-US" sz="1600" dirty="0">
                 <a:solidFill>
                   <a:srgbClr val="17375E"/>
                 </a:solidFill>
@@ -17609,7 +18613,7 @@
               <a:buFont typeface="Arial" panose="020B0604020202020204" pitchFamily="34" charset="0"/>
               <a:buChar char="•"/>
             </a:pPr>
-            <a:endParaRPr lang="en-US" sz="1600" dirty="0" smtClean="0">
+            <a:endParaRPr lang="en-US" sz="1600" dirty="0">
               <a:solidFill>
                 <a:srgbClr val="17375E"/>
               </a:solidFill>
@@ -17621,7 +18625,7 @@
               <a:buChar char="•"/>
             </a:pPr>
             <a:r>
-              <a:rPr lang="en-US" sz="1600" dirty="0" smtClean="0">
+              <a:rPr lang="en-US" sz="1600" b="1" dirty="0">
                 <a:solidFill>
                   <a:srgbClr val="17375E"/>
                 </a:solidFill>
@@ -17640,19 +18644,41 @@
                   <a:srgbClr val="17375E"/>
                 </a:solidFill>
               </a:rPr>
-              <a:t>Must have data to fit the coupling coefficient profile vs perturbation size</a:t>
-            </a:r>
-            <a:r>
-              <a:rPr lang="en-US" sz="1600" dirty="0" smtClean="0">
-                <a:solidFill>
-                  <a:srgbClr val="17375E"/>
-                </a:solidFill>
-              </a:rPr>
-              <a:t>!</a:t>
-            </a:r>
-          </a:p>
-        </p:txBody>
-      </p:sp>
+              <a:t>Must have data to fit the coupling coefficient profile vs perturbation size!</a:t>
+            </a:r>
+          </a:p>
+        </p:txBody>
+      </p:sp>
+      <p:pic>
+        <p:nvPicPr>
+          <p:cNvPr id="7" name="Picture 6">
+            <a:extLst>
+              <a:ext uri="{FF2B5EF4-FFF2-40B4-BE49-F238E27FC236}">
+                <a16:creationId xmlns:a16="http://schemas.microsoft.com/office/drawing/2014/main" id="{E17B6E71-E603-46D0-BCFA-6AB715875801}"/>
+              </a:ext>
+            </a:extLst>
+          </p:cNvPr>
+          <p:cNvPicPr>
+            <a:picLocks noChangeAspect="1"/>
+          </p:cNvPicPr>
+          <p:nvPr/>
+        </p:nvPicPr>
+        <p:blipFill>
+          <a:blip r:embed="rId4"/>
+          <a:stretch>
+            <a:fillRect/>
+          </a:stretch>
+        </p:blipFill>
+        <p:spPr>
+          <a:xfrm>
+            <a:off x="5396977" y="3212976"/>
+            <a:ext cx="3754623" cy="1441545"/>
+          </a:xfrm>
+          <a:prstGeom prst="rect">
+            <a:avLst/>
+          </a:prstGeom>
+        </p:spPr>
+      </p:pic>
     </p:spTree>
     <p:extLst>
       <p:ext uri="{BB962C8B-B14F-4D97-AF65-F5344CB8AC3E}">
@@ -17812,18 +18838,13 @@
               <a:buChar char="•"/>
             </a:pPr>
             <a:r>
-              <a:rPr lang="en-US" sz="1600" dirty="0" smtClean="0">
+              <a:rPr lang="en-US" sz="1600" b="1" dirty="0">
                 <a:solidFill>
                   <a:srgbClr val="17375E"/>
                 </a:solidFill>
               </a:rPr>
               <a:t>Sample spectra:</a:t>
             </a:r>
-            <a:endParaRPr lang="en-US" sz="1600" dirty="0">
-              <a:solidFill>
-                <a:srgbClr val="17375E"/>
-              </a:solidFill>
-            </a:endParaRPr>
           </a:p>
         </p:txBody>
       </p:sp>
@@ -17909,13 +18930,8 @@
           <a:p>
             <a:r>
               <a:rPr lang="en-CA" dirty="0"/>
-              <a:t>Bragg Gratings: </a:t>
-            </a:r>
-            <a:r>
-              <a:rPr lang="en-CA" dirty="0" smtClean="0"/>
-              <a:t>EME</a:t>
-            </a:r>
-            <a:endParaRPr lang="en-CA" dirty="0"/>
+              <a:t>Bragg Gratings: EME</a:t>
+            </a:r>
           </a:p>
         </p:txBody>
       </p:sp>
@@ -17997,7 +19013,7 @@
         <p:spPr>
           <a:xfrm>
             <a:off x="107504" y="1250160"/>
-            <a:ext cx="7344816" cy="4031873"/>
+            <a:ext cx="7704856" cy="4770537"/>
           </a:xfrm>
           <a:prstGeom prst="rect">
             <a:avLst/>
@@ -18015,7 +19031,7 @@
               <a:buChar char="•"/>
             </a:pPr>
             <a:r>
-              <a:rPr lang="en-US" sz="1600" dirty="0" smtClean="0">
+              <a:rPr lang="en-US" sz="1600" b="1" dirty="0">
                 <a:solidFill>
                   <a:srgbClr val="17375E"/>
                 </a:solidFill>
@@ -18029,7 +19045,7 @@
               <a:buChar char="•"/>
             </a:pPr>
             <a:r>
-              <a:rPr lang="en-US" sz="1200" dirty="0" smtClean="0">
+              <a:rPr lang="en-US" sz="1600" dirty="0">
                 <a:solidFill>
                   <a:srgbClr val="17375E"/>
                 </a:solidFill>
@@ -18037,18 +19053,12 @@
               <a:t>Explained: </a:t>
             </a:r>
             <a:r>
-              <a:rPr lang="en-US" sz="1200" dirty="0">
+              <a:rPr lang="en-US" sz="1600" dirty="0">
                 <a:hlinkClick r:id="rId3"/>
               </a:rPr>
-              <a:t>https://</a:t>
-            </a:r>
-            <a:r>
-              <a:rPr lang="en-US" sz="1200" dirty="0" smtClean="0">
-                <a:hlinkClick r:id="rId3"/>
-              </a:rPr>
-              <a:t>apps.lumerical.com/pic_passive_bragg_full_device_simulation_with_eme.html</a:t>
-            </a:r>
-            <a:endParaRPr lang="en-US" sz="1200" dirty="0" smtClean="0"/>
+              <a:t>https://apps.lumerical.com/pic_passive_bragg_full_device_simulation_with_eme.html</a:t>
+            </a:r>
+            <a:endParaRPr lang="en-US" sz="1600" dirty="0"/>
           </a:p>
           <a:p>
             <a:pPr marL="1200150" lvl="2" indent="-285750">
@@ -18067,7 +19077,7 @@
               <a:buChar char="•"/>
             </a:pPr>
             <a:r>
-              <a:rPr lang="en-US" sz="1200" dirty="0" smtClean="0">
+              <a:rPr lang="en-US" sz="1600" dirty="0">
                 <a:solidFill>
                   <a:srgbClr val="17375E"/>
                 </a:solidFill>
@@ -18075,18 +19085,12 @@
               <a:t>Video tutorial: </a:t>
             </a:r>
             <a:r>
-              <a:rPr lang="en-US" sz="1200" dirty="0">
+              <a:rPr lang="en-US" sz="1600" dirty="0">
                 <a:hlinkClick r:id="rId4"/>
               </a:rPr>
-              <a:t>https://</a:t>
-            </a:r>
-            <a:r>
-              <a:rPr lang="en-US" sz="1200" dirty="0" smtClean="0">
-                <a:hlinkClick r:id="rId4"/>
-              </a:rPr>
-              <a:t>www.lumerical.com/support/video/waveguide-bragg-gratings-res.html</a:t>
-            </a:r>
-            <a:endParaRPr lang="en-US" sz="1200" dirty="0" smtClean="0"/>
+              <a:t>https://www.lumerical.com/support/video/waveguide-bragg-gratings-res.html</a:t>
+            </a:r>
+            <a:endParaRPr lang="en-US" sz="1600" dirty="0"/>
           </a:p>
           <a:p>
             <a:pPr marL="1200150" lvl="2" indent="-285750">
@@ -18105,7 +19109,7 @@
               <a:buChar char="•"/>
             </a:pPr>
             <a:r>
-              <a:rPr lang="en-US" sz="1600" dirty="0" smtClean="0">
+              <a:rPr lang="en-US" sz="1600" b="1" dirty="0">
                 <a:solidFill>
                   <a:srgbClr val="17375E"/>
                 </a:solidFill>
@@ -18119,7 +19123,7 @@
               <a:buChar char="•"/>
             </a:pPr>
             <a:r>
-              <a:rPr lang="en-US" sz="1600" dirty="0" smtClean="0">
+              <a:rPr lang="en-US" sz="1600" dirty="0">
                 <a:solidFill>
                   <a:srgbClr val="17375E"/>
                 </a:solidFill>
@@ -18133,7 +19137,7 @@
               <a:buChar char="•"/>
             </a:pPr>
             <a:r>
-              <a:rPr lang="en-US" sz="1600" dirty="0" smtClean="0">
+              <a:rPr lang="en-US" sz="1600" dirty="0">
                 <a:solidFill>
                   <a:srgbClr val="17375E"/>
                 </a:solidFill>
@@ -18146,19 +19150,30 @@
               <a:buFont typeface="Arial" panose="020B0604020202020204" pitchFamily="34" charset="0"/>
               <a:buChar char="•"/>
             </a:pPr>
-            <a:endParaRPr lang="en-US" sz="1600" dirty="0" smtClean="0">
+            <a:endParaRPr lang="en-US" sz="1600" dirty="0">
               <a:solidFill>
                 <a:srgbClr val="17375E"/>
               </a:solidFill>
             </a:endParaRPr>
           </a:p>
           <a:p>
+            <a:pPr marL="1200150" lvl="2" indent="-285750">
+              <a:buFont typeface="Arial" panose="020B0604020202020204" pitchFamily="34" charset="0"/>
+              <a:buChar char="•"/>
+            </a:pPr>
+            <a:endParaRPr lang="en-US" sz="1600" b="1" dirty="0">
+              <a:solidFill>
+                <a:srgbClr val="17375E"/>
+              </a:solidFill>
+            </a:endParaRPr>
+          </a:p>
+          <a:p>
             <a:pPr marL="742950" lvl="1" indent="-285750">
               <a:buFont typeface="Arial" panose="020B0604020202020204" pitchFamily="34" charset="0"/>
               <a:buChar char="•"/>
             </a:pPr>
             <a:r>
-              <a:rPr lang="en-US" sz="1600" dirty="0" smtClean="0">
+              <a:rPr lang="en-US" sz="1600" b="1" dirty="0">
                 <a:solidFill>
                   <a:srgbClr val="17375E"/>
                 </a:solidFill>
@@ -18172,7 +19187,7 @@
               <a:buChar char="•"/>
             </a:pPr>
             <a:r>
-              <a:rPr lang="en-US" sz="1600" dirty="0" smtClean="0">
+              <a:rPr lang="en-US" sz="1600" dirty="0">
                 <a:solidFill>
                   <a:srgbClr val="17375E"/>
                 </a:solidFill>
@@ -18186,7 +19201,7 @@
               <a:buChar char="•"/>
             </a:pPr>
             <a:r>
-              <a:rPr lang="en-US" sz="1600" dirty="0" smtClean="0">
+              <a:rPr lang="en-US" sz="1600" dirty="0">
                 <a:solidFill>
                   <a:srgbClr val="17375E"/>
                 </a:solidFill>
@@ -18200,32 +19215,25 @@
               <a:buChar char="•"/>
             </a:pPr>
             <a:r>
-              <a:rPr lang="en-US" sz="1600" dirty="0" smtClean="0">
+              <a:rPr lang="en-US" sz="1600" dirty="0">
                 <a:solidFill>
                   <a:srgbClr val="17375E"/>
                 </a:solidFill>
               </a:rPr>
-              <a:t>Less accurate than FDTD </a:t>
-            </a:r>
-            <a:r>
-              <a:rPr lang="en-US" sz="1600" dirty="0" err="1" smtClean="0">
-                <a:solidFill>
-                  <a:srgbClr val="17375E"/>
-                </a:solidFill>
-              </a:rPr>
-              <a:t>simulationse</a:t>
-            </a:r>
-            <a:endParaRPr lang="en-US" sz="1600" dirty="0" smtClean="0">
-              <a:solidFill>
-                <a:srgbClr val="17375E"/>
-              </a:solidFill>
-            </a:endParaRPr>
+              <a:t>Less accurate than FDTD simulations</a:t>
+            </a:r>
           </a:p>
         </p:txBody>
       </p:sp>
       <p:pic>
         <p:nvPicPr>
-          <p:cNvPr id="5" name="Picture 4"/>
+          <p:cNvPr id="3" name="Picture 2">
+            <a:extLst>
+              <a:ext uri="{FF2B5EF4-FFF2-40B4-BE49-F238E27FC236}">
+                <a16:creationId xmlns:a16="http://schemas.microsoft.com/office/drawing/2014/main" id="{1AE2846B-54CB-4891-A31F-D9210B67913F}"/>
+              </a:ext>
+            </a:extLst>
+          </p:cNvPr>
           <p:cNvPicPr>
             <a:picLocks noChangeAspect="1"/>
           </p:cNvPicPr>
@@ -18239,8 +19247,8 @@
         </p:blipFill>
         <p:spPr>
           <a:xfrm>
-            <a:off x="7564632" y="1862426"/>
-            <a:ext cx="1467055" cy="2314898"/>
+            <a:off x="7291944" y="3833875"/>
+            <a:ext cx="1852056" cy="2087641"/>
           </a:xfrm>
           <a:prstGeom prst="rect">
             <a:avLst/>
@@ -18305,13 +19313,8 @@
           <a:p>
             <a:r>
               <a:rPr lang="en-CA" dirty="0"/>
-              <a:t>Bragg Gratings: </a:t>
-            </a:r>
-            <a:r>
-              <a:rPr lang="en-CA" dirty="0" smtClean="0"/>
-              <a:t>EME</a:t>
-            </a:r>
-            <a:endParaRPr lang="en-CA" dirty="0"/>
+              <a:t>Bragg Gratings: EME</a:t>
+            </a:r>
           </a:p>
         </p:txBody>
       </p:sp>
@@ -18411,7 +19414,7 @@
               <a:buChar char="•"/>
             </a:pPr>
             <a:r>
-              <a:rPr lang="en-US" sz="1600" dirty="0" smtClean="0">
+              <a:rPr lang="en-US" sz="1600" dirty="0">
                 <a:solidFill>
                   <a:srgbClr val="17375E"/>
                 </a:solidFill>
@@ -18419,14 +19422,14 @@
               <a:t>Run sample code </a:t>
             </a:r>
             <a:r>
-              <a:rPr lang="en-US" sz="1600" b="1" i="1" dirty="0" err="1" smtClean="0">
+              <a:rPr lang="en-US" sz="1600" b="1" i="1" dirty="0" err="1">
                 <a:solidFill>
                   <a:srgbClr val="17375E"/>
                 </a:solidFill>
               </a:rPr>
               <a:t>MAIN_EME.lsf</a:t>
             </a:r>
-            <a:endParaRPr lang="en-US" sz="1600" b="1" i="1" dirty="0" smtClean="0">
+            <a:endParaRPr lang="en-US" sz="1600" b="1" i="1" dirty="0">
               <a:solidFill>
                 <a:srgbClr val="17375E"/>
               </a:solidFill>
@@ -18448,7 +19451,7 @@
               <a:buFont typeface="Arial" panose="020B0604020202020204" pitchFamily="34" charset="0"/>
               <a:buChar char="•"/>
             </a:pPr>
-            <a:endParaRPr lang="en-US" sz="1600" b="1" i="1" dirty="0" smtClean="0">
+            <a:endParaRPr lang="en-US" sz="1600" b="1" i="1" dirty="0">
               <a:solidFill>
                 <a:srgbClr val="17375E"/>
               </a:solidFill>
@@ -18460,7 +19463,7 @@
               <a:buChar char="•"/>
             </a:pPr>
             <a:r>
-              <a:rPr lang="en-US" sz="1600" dirty="0" smtClean="0">
+              <a:rPr lang="en-US" sz="1600" b="1" dirty="0">
                 <a:solidFill>
                   <a:srgbClr val="17375E"/>
                 </a:solidFill>
@@ -18474,24 +19477,19 @@
               <a:buChar char="•"/>
             </a:pPr>
             <a:r>
-              <a:rPr lang="en-US" sz="1600" dirty="0" smtClean="0">
+              <a:rPr lang="en-US" sz="1600" dirty="0">
                 <a:solidFill>
                   <a:srgbClr val="17375E"/>
                 </a:solidFill>
               </a:rPr>
               <a:t>Device physical parameters</a:t>
             </a:r>
-            <a:endParaRPr lang="en-US" sz="1600" dirty="0">
-              <a:solidFill>
-                <a:srgbClr val="17375E"/>
-              </a:solidFill>
-            </a:endParaRPr>
           </a:p>
         </p:txBody>
       </p:sp>
       <p:pic>
         <p:nvPicPr>
-          <p:cNvPr id="3" name="Picture 2"/>
+          <p:cNvPr id="7" name="Picture 6"/>
           <p:cNvPicPr>
             <a:picLocks noChangeAspect="1"/>
           </p:cNvPicPr>
@@ -18505,8 +19503,8 @@
         </p:blipFill>
         <p:spPr>
           <a:xfrm>
-            <a:off x="6804248" y="1340647"/>
-            <a:ext cx="2104396" cy="4599299"/>
+            <a:off x="468876" y="2826206"/>
+            <a:ext cx="6135522" cy="3096054"/>
           </a:xfrm>
           <a:prstGeom prst="rect">
             <a:avLst/>
@@ -18515,7 +19513,13 @@
       </p:pic>
       <p:pic>
         <p:nvPicPr>
-          <p:cNvPr id="7" name="Picture 6"/>
+          <p:cNvPr id="5" name="Picture 4">
+            <a:extLst>
+              <a:ext uri="{FF2B5EF4-FFF2-40B4-BE49-F238E27FC236}">
+                <a16:creationId xmlns:a16="http://schemas.microsoft.com/office/drawing/2014/main" id="{06CC0B58-01E1-4E01-AAB9-75B14492287F}"/>
+              </a:ext>
+            </a:extLst>
+          </p:cNvPr>
           <p:cNvPicPr>
             <a:picLocks noChangeAspect="1"/>
           </p:cNvPicPr>
@@ -18529,8 +19533,8 @@
         </p:blipFill>
         <p:spPr>
           <a:xfrm>
-            <a:off x="468876" y="2826206"/>
-            <a:ext cx="6135522" cy="3096054"/>
+            <a:off x="5303556" y="1207991"/>
+            <a:ext cx="3642676" cy="2438611"/>
           </a:xfrm>
           <a:prstGeom prst="rect">
             <a:avLst/>
@@ -18595,13 +19599,8 @@
           <a:p>
             <a:r>
               <a:rPr lang="en-CA" dirty="0"/>
-              <a:t>Bragg Gratings: </a:t>
-            </a:r>
-            <a:r>
-              <a:rPr lang="en-CA" dirty="0" smtClean="0"/>
-              <a:t>EME</a:t>
-            </a:r>
-            <a:endParaRPr lang="en-CA" dirty="0"/>
+              <a:t>Bragg Gratings: EME</a:t>
+            </a:r>
           </a:p>
         </p:txBody>
       </p:sp>
@@ -18750,13 +19749,8 @@
           <a:p>
             <a:r>
               <a:rPr lang="en-CA" dirty="0"/>
-              <a:t>Bragg Gratings: </a:t>
-            </a:r>
-            <a:r>
-              <a:rPr lang="en-CA" dirty="0" smtClean="0"/>
-              <a:t>EME</a:t>
-            </a:r>
-            <a:endParaRPr lang="en-CA" dirty="0"/>
+              <a:t>Bragg Gratings: EME</a:t>
+            </a:r>
           </a:p>
         </p:txBody>
       </p:sp>
@@ -18856,7 +19850,7 @@
               <a:buChar char="•"/>
             </a:pPr>
             <a:r>
-              <a:rPr lang="en-US" sz="1600" dirty="0" smtClean="0">
+              <a:rPr lang="en-US" sz="1600" dirty="0">
                 <a:solidFill>
                   <a:srgbClr val="17375E"/>
                 </a:solidFill>
@@ -18864,7 +19858,7 @@
               <a:t>EME simulations can be used to quickly perform parametric studies to understand the effects of specific parameters, i.e. </a:t>
             </a:r>
             <a:r>
-              <a:rPr lang="en-US" sz="1600" b="1" dirty="0" smtClean="0">
+              <a:rPr lang="en-US" sz="1600" b="1" dirty="0">
                 <a:solidFill>
                   <a:srgbClr val="17375E"/>
                 </a:solidFill>
@@ -18872,7 +19866,7 @@
               <a:t>the effects of changing the waveguide’s sidewall angle</a:t>
             </a:r>
             <a:r>
-              <a:rPr lang="en-US" sz="1600" dirty="0" smtClean="0">
+              <a:rPr lang="en-US" sz="1600" dirty="0">
                 <a:solidFill>
                   <a:srgbClr val="17375E"/>
                 </a:solidFill>
@@ -18897,7 +19891,7 @@
               <a:buChar char="•"/>
             </a:pPr>
             <a:r>
-              <a:rPr lang="en-US" sz="1600" dirty="0" smtClean="0">
+              <a:rPr lang="en-US" sz="1600" dirty="0">
                 <a:solidFill>
                   <a:srgbClr val="17375E"/>
                 </a:solidFill>
@@ -18905,7 +19899,7 @@
               <a:t>Run applications -&gt; </a:t>
             </a:r>
             <a:r>
-              <a:rPr lang="en-US" sz="1600" dirty="0" err="1" smtClean="0">
+              <a:rPr lang="en-US" sz="1600" dirty="0" err="1">
                 <a:solidFill>
                   <a:srgbClr val="17375E"/>
                 </a:solidFill>
@@ -18913,7 +19907,7 @@
               <a:t>dw_sweep</a:t>
             </a:r>
             <a:r>
-              <a:rPr lang="en-US" sz="1600" dirty="0" smtClean="0">
+              <a:rPr lang="en-US" sz="1600" dirty="0">
                 <a:solidFill>
                   <a:srgbClr val="17375E"/>
                 </a:solidFill>
@@ -18921,7 +19915,7 @@
               <a:t> -&gt; </a:t>
             </a:r>
             <a:r>
-              <a:rPr lang="en-US" sz="1600" b="1" dirty="0" err="1" smtClean="0">
+              <a:rPr lang="en-US" sz="1600" b="1" dirty="0" err="1">
                 <a:solidFill>
                   <a:srgbClr val="17375E"/>
                 </a:solidFill>

</xml_diff>